<commit_message>
Rechtschreibfehler in presentation korrigiert
</commit_message>
<xml_diff>
--- a/designPresentation (Last Version).pptx
+++ b/designPresentation (Last Version).pptx
@@ -939,7 +939,7 @@
           <p:cNvPr id="2" name="Title 1">
             <a:extLst>
               <a:ext uri="{FF2B5EF4-FFF2-40B4-BE49-F238E27FC236}">
-                <a16:creationId xmlns:a16="http://schemas.microsoft.com/office/drawing/2014/main" id="{7E88F73C-375F-794D-BDE8-EFE6739818FE}"/>
+                <a16:creationId xmlns:a16="http://schemas.microsoft.com/office/drawing/2014/main" xmlns="" id="{7E88F73C-375F-794D-BDE8-EFE6739818FE}"/>
               </a:ext>
             </a:extLst>
           </p:cNvPr>
@@ -977,7 +977,7 @@
           <p:cNvPr id="3" name="Subtitle 2">
             <a:extLst>
               <a:ext uri="{FF2B5EF4-FFF2-40B4-BE49-F238E27FC236}">
-                <a16:creationId xmlns:a16="http://schemas.microsoft.com/office/drawing/2014/main" id="{FEE3D3D7-BF98-3F44-BAFC-3865308B50C5}"/>
+                <a16:creationId xmlns:a16="http://schemas.microsoft.com/office/drawing/2014/main" xmlns="" id="{FEE3D3D7-BF98-3F44-BAFC-3865308B50C5}"/>
               </a:ext>
             </a:extLst>
           </p:cNvPr>
@@ -1048,7 +1048,7 @@
           <p:cNvPr id="4" name="Date Placeholder 3">
             <a:extLst>
               <a:ext uri="{FF2B5EF4-FFF2-40B4-BE49-F238E27FC236}">
-                <a16:creationId xmlns:a16="http://schemas.microsoft.com/office/drawing/2014/main" id="{F0D58DD8-1179-374D-99B7-DEBADA6068C4}"/>
+                <a16:creationId xmlns:a16="http://schemas.microsoft.com/office/drawing/2014/main" xmlns="" id="{F0D58DD8-1179-374D-99B7-DEBADA6068C4}"/>
               </a:ext>
             </a:extLst>
           </p:cNvPr>
@@ -1066,7 +1066,7 @@
           <a:p>
             <a:fld id="{BB952F2C-18EB-874B-AD29-1FB7E93EC6CB}" type="datetimeFigureOut">
               <a:rPr lang="de-DE" smtClean="0"/>
-              <a:t>20.12.18</a:t>
+              <a:t>20.12.2018</a:t>
             </a:fld>
             <a:endParaRPr lang="de-DE"/>
           </a:p>
@@ -1077,7 +1077,7 @@
           <p:cNvPr id="5" name="Footer Placeholder 4">
             <a:extLst>
               <a:ext uri="{FF2B5EF4-FFF2-40B4-BE49-F238E27FC236}">
-                <a16:creationId xmlns:a16="http://schemas.microsoft.com/office/drawing/2014/main" id="{C17F90C6-66F0-6644-92BB-84C2E6823BB5}"/>
+                <a16:creationId xmlns:a16="http://schemas.microsoft.com/office/drawing/2014/main" xmlns="" id="{C17F90C6-66F0-6644-92BB-84C2E6823BB5}"/>
               </a:ext>
             </a:extLst>
           </p:cNvPr>
@@ -1102,7 +1102,7 @@
           <p:cNvPr id="6" name="Slide Number Placeholder 5">
             <a:extLst>
               <a:ext uri="{FF2B5EF4-FFF2-40B4-BE49-F238E27FC236}">
-                <a16:creationId xmlns:a16="http://schemas.microsoft.com/office/drawing/2014/main" id="{C6F0552F-ACDF-D54B-A4A9-AE410925BE62}"/>
+                <a16:creationId xmlns:a16="http://schemas.microsoft.com/office/drawing/2014/main" xmlns="" id="{C6F0552F-ACDF-D54B-A4A9-AE410925BE62}"/>
               </a:ext>
             </a:extLst>
           </p:cNvPr>
@@ -1161,7 +1161,7 @@
           <p:cNvPr id="2" name="Title 1">
             <a:extLst>
               <a:ext uri="{FF2B5EF4-FFF2-40B4-BE49-F238E27FC236}">
-                <a16:creationId xmlns:a16="http://schemas.microsoft.com/office/drawing/2014/main" id="{FB56BBFD-B987-114A-9689-11CD37F62B09}"/>
+                <a16:creationId xmlns:a16="http://schemas.microsoft.com/office/drawing/2014/main" xmlns="" id="{FB56BBFD-B987-114A-9689-11CD37F62B09}"/>
               </a:ext>
             </a:extLst>
           </p:cNvPr>
@@ -1190,7 +1190,7 @@
           <p:cNvPr id="3" name="Vertical Text Placeholder 2">
             <a:extLst>
               <a:ext uri="{FF2B5EF4-FFF2-40B4-BE49-F238E27FC236}">
-                <a16:creationId xmlns:a16="http://schemas.microsoft.com/office/drawing/2014/main" id="{EC070103-7ED8-C146-84E1-FCEA764E2426}"/>
+                <a16:creationId xmlns:a16="http://schemas.microsoft.com/office/drawing/2014/main" xmlns="" id="{EC070103-7ED8-C146-84E1-FCEA764E2426}"/>
               </a:ext>
             </a:extLst>
           </p:cNvPr>
@@ -1248,7 +1248,7 @@
           <p:cNvPr id="4" name="Date Placeholder 3">
             <a:extLst>
               <a:ext uri="{FF2B5EF4-FFF2-40B4-BE49-F238E27FC236}">
-                <a16:creationId xmlns:a16="http://schemas.microsoft.com/office/drawing/2014/main" id="{93DE371D-6056-A841-98F1-FF5CD40B6B1E}"/>
+                <a16:creationId xmlns:a16="http://schemas.microsoft.com/office/drawing/2014/main" xmlns="" id="{93DE371D-6056-A841-98F1-FF5CD40B6B1E}"/>
               </a:ext>
             </a:extLst>
           </p:cNvPr>
@@ -1273,7 +1273,7 @@
           <p:cNvPr id="5" name="Footer Placeholder 4">
             <a:extLst>
               <a:ext uri="{FF2B5EF4-FFF2-40B4-BE49-F238E27FC236}">
-                <a16:creationId xmlns:a16="http://schemas.microsoft.com/office/drawing/2014/main" id="{CC39B2D2-B1B6-D54C-A3FA-EACEDC23E838}"/>
+                <a16:creationId xmlns:a16="http://schemas.microsoft.com/office/drawing/2014/main" xmlns="" id="{CC39B2D2-B1B6-D54C-A3FA-EACEDC23E838}"/>
               </a:ext>
             </a:extLst>
           </p:cNvPr>
@@ -1305,7 +1305,7 @@
           <p:cNvPr id="6" name="Slide Number Placeholder 5">
             <a:extLst>
               <a:ext uri="{FF2B5EF4-FFF2-40B4-BE49-F238E27FC236}">
-                <a16:creationId xmlns:a16="http://schemas.microsoft.com/office/drawing/2014/main" id="{48A9833D-0CCB-EE40-AA30-2D272ACD3516}"/>
+                <a16:creationId xmlns:a16="http://schemas.microsoft.com/office/drawing/2014/main" xmlns="" id="{48A9833D-0CCB-EE40-AA30-2D272ACD3516}"/>
               </a:ext>
             </a:extLst>
           </p:cNvPr>
@@ -1366,7 +1366,7 @@
           <p:cNvPr id="2" name="Vertical Title 1">
             <a:extLst>
               <a:ext uri="{FF2B5EF4-FFF2-40B4-BE49-F238E27FC236}">
-                <a16:creationId xmlns:a16="http://schemas.microsoft.com/office/drawing/2014/main" id="{44E4C8B7-7D78-0740-AA8D-A1C91A3AC65C}"/>
+                <a16:creationId xmlns:a16="http://schemas.microsoft.com/office/drawing/2014/main" xmlns="" id="{44E4C8B7-7D78-0740-AA8D-A1C91A3AC65C}"/>
               </a:ext>
             </a:extLst>
           </p:cNvPr>
@@ -1400,7 +1400,7 @@
           <p:cNvPr id="3" name="Vertical Text Placeholder 2">
             <a:extLst>
               <a:ext uri="{FF2B5EF4-FFF2-40B4-BE49-F238E27FC236}">
-                <a16:creationId xmlns:a16="http://schemas.microsoft.com/office/drawing/2014/main" id="{35B1C7C2-C96D-DE4B-ADF7-19287AFC59A3}"/>
+                <a16:creationId xmlns:a16="http://schemas.microsoft.com/office/drawing/2014/main" xmlns="" id="{35B1C7C2-C96D-DE4B-ADF7-19287AFC59A3}"/>
               </a:ext>
             </a:extLst>
           </p:cNvPr>
@@ -1463,7 +1463,7 @@
           <p:cNvPr id="4" name="Date Placeholder 3">
             <a:extLst>
               <a:ext uri="{FF2B5EF4-FFF2-40B4-BE49-F238E27FC236}">
-                <a16:creationId xmlns:a16="http://schemas.microsoft.com/office/drawing/2014/main" id="{9961F313-9216-584E-8023-476491079D5C}"/>
+                <a16:creationId xmlns:a16="http://schemas.microsoft.com/office/drawing/2014/main" xmlns="" id="{9961F313-9216-584E-8023-476491079D5C}"/>
               </a:ext>
             </a:extLst>
           </p:cNvPr>
@@ -1488,7 +1488,7 @@
           <p:cNvPr id="5" name="Footer Placeholder 4">
             <a:extLst>
               <a:ext uri="{FF2B5EF4-FFF2-40B4-BE49-F238E27FC236}">
-                <a16:creationId xmlns:a16="http://schemas.microsoft.com/office/drawing/2014/main" id="{24B7C63F-45EB-A14D-9C67-454D93132A75}"/>
+                <a16:creationId xmlns:a16="http://schemas.microsoft.com/office/drawing/2014/main" xmlns="" id="{24B7C63F-45EB-A14D-9C67-454D93132A75}"/>
               </a:ext>
             </a:extLst>
           </p:cNvPr>
@@ -1520,7 +1520,7 @@
           <p:cNvPr id="6" name="Slide Number Placeholder 5">
             <a:extLst>
               <a:ext uri="{FF2B5EF4-FFF2-40B4-BE49-F238E27FC236}">
-                <a16:creationId xmlns:a16="http://schemas.microsoft.com/office/drawing/2014/main" id="{FF01E423-DE25-F24C-8EB9-D29C7B741D70}"/>
+                <a16:creationId xmlns:a16="http://schemas.microsoft.com/office/drawing/2014/main" xmlns="" id="{FF01E423-DE25-F24C-8EB9-D29C7B741D70}"/>
               </a:ext>
             </a:extLst>
           </p:cNvPr>
@@ -2471,7 +2471,7 @@
           <p:cNvPr id="2" name="Title 1">
             <a:extLst>
               <a:ext uri="{FF2B5EF4-FFF2-40B4-BE49-F238E27FC236}">
-                <a16:creationId xmlns:a16="http://schemas.microsoft.com/office/drawing/2014/main" id="{FF133207-7B1F-7740-9FFB-7DA79069F818}"/>
+                <a16:creationId xmlns:a16="http://schemas.microsoft.com/office/drawing/2014/main" xmlns="" id="{FF133207-7B1F-7740-9FFB-7DA79069F818}"/>
               </a:ext>
             </a:extLst>
           </p:cNvPr>
@@ -2500,7 +2500,7 @@
           <p:cNvPr id="3" name="Content Placeholder 2">
             <a:extLst>
               <a:ext uri="{FF2B5EF4-FFF2-40B4-BE49-F238E27FC236}">
-                <a16:creationId xmlns:a16="http://schemas.microsoft.com/office/drawing/2014/main" id="{D1F62CC1-E655-254C-A823-87D809AB5D3F}"/>
+                <a16:creationId xmlns:a16="http://schemas.microsoft.com/office/drawing/2014/main" xmlns="" id="{D1F62CC1-E655-254C-A823-87D809AB5D3F}"/>
               </a:ext>
             </a:extLst>
           </p:cNvPr>
@@ -2558,7 +2558,7 @@
           <p:cNvPr id="4" name="Date Placeholder 3">
             <a:extLst>
               <a:ext uri="{FF2B5EF4-FFF2-40B4-BE49-F238E27FC236}">
-                <a16:creationId xmlns:a16="http://schemas.microsoft.com/office/drawing/2014/main" id="{36A6C09A-9CF3-3944-97EF-F0470570CB75}"/>
+                <a16:creationId xmlns:a16="http://schemas.microsoft.com/office/drawing/2014/main" xmlns="" id="{36A6C09A-9CF3-3944-97EF-F0470570CB75}"/>
               </a:ext>
             </a:extLst>
           </p:cNvPr>
@@ -2583,7 +2583,7 @@
           <p:cNvPr id="5" name="Footer Placeholder 4">
             <a:extLst>
               <a:ext uri="{FF2B5EF4-FFF2-40B4-BE49-F238E27FC236}">
-                <a16:creationId xmlns:a16="http://schemas.microsoft.com/office/drawing/2014/main" id="{EF9EC296-08AD-9B4A-940D-C8AD836FDB4C}"/>
+                <a16:creationId xmlns:a16="http://schemas.microsoft.com/office/drawing/2014/main" xmlns="" id="{EF9EC296-08AD-9B4A-940D-C8AD836FDB4C}"/>
               </a:ext>
             </a:extLst>
           </p:cNvPr>
@@ -2615,7 +2615,7 @@
           <p:cNvPr id="6" name="Slide Number Placeholder 5">
             <a:extLst>
               <a:ext uri="{FF2B5EF4-FFF2-40B4-BE49-F238E27FC236}">
-                <a16:creationId xmlns:a16="http://schemas.microsoft.com/office/drawing/2014/main" id="{4DF8B943-C9E1-784E-966C-DFED03F376EB}"/>
+                <a16:creationId xmlns:a16="http://schemas.microsoft.com/office/drawing/2014/main" xmlns="" id="{4DF8B943-C9E1-784E-966C-DFED03F376EB}"/>
               </a:ext>
             </a:extLst>
           </p:cNvPr>
@@ -2676,7 +2676,7 @@
           <p:cNvPr id="2" name="Title 1">
             <a:extLst>
               <a:ext uri="{FF2B5EF4-FFF2-40B4-BE49-F238E27FC236}">
-                <a16:creationId xmlns:a16="http://schemas.microsoft.com/office/drawing/2014/main" id="{957A4FCC-CF0A-2C41-8CFE-E6CFD7AA1A38}"/>
+                <a16:creationId xmlns:a16="http://schemas.microsoft.com/office/drawing/2014/main" xmlns="" id="{957A4FCC-CF0A-2C41-8CFE-E6CFD7AA1A38}"/>
               </a:ext>
             </a:extLst>
           </p:cNvPr>
@@ -2714,7 +2714,7 @@
           <p:cNvPr id="3" name="Text Placeholder 2">
             <a:extLst>
               <a:ext uri="{FF2B5EF4-FFF2-40B4-BE49-F238E27FC236}">
-                <a16:creationId xmlns:a16="http://schemas.microsoft.com/office/drawing/2014/main" id="{7D0A0DCD-F2C6-534B-A76A-6C122B3D3330}"/>
+                <a16:creationId xmlns:a16="http://schemas.microsoft.com/office/drawing/2014/main" xmlns="" id="{7D0A0DCD-F2C6-534B-A76A-6C122B3D3330}"/>
               </a:ext>
             </a:extLst>
           </p:cNvPr>
@@ -2839,7 +2839,7 @@
           <p:cNvPr id="4" name="Date Placeholder 3">
             <a:extLst>
               <a:ext uri="{FF2B5EF4-FFF2-40B4-BE49-F238E27FC236}">
-                <a16:creationId xmlns:a16="http://schemas.microsoft.com/office/drawing/2014/main" id="{98F0425D-4F04-B34C-879E-F86ACAEF5DB7}"/>
+                <a16:creationId xmlns:a16="http://schemas.microsoft.com/office/drawing/2014/main" xmlns="" id="{98F0425D-4F04-B34C-879E-F86ACAEF5DB7}"/>
               </a:ext>
             </a:extLst>
           </p:cNvPr>
@@ -2864,7 +2864,7 @@
           <p:cNvPr id="5" name="Footer Placeholder 4">
             <a:extLst>
               <a:ext uri="{FF2B5EF4-FFF2-40B4-BE49-F238E27FC236}">
-                <a16:creationId xmlns:a16="http://schemas.microsoft.com/office/drawing/2014/main" id="{0DD41CA7-5A3C-3C41-9BB2-18654DD6B887}"/>
+                <a16:creationId xmlns:a16="http://schemas.microsoft.com/office/drawing/2014/main" xmlns="" id="{0DD41CA7-5A3C-3C41-9BB2-18654DD6B887}"/>
               </a:ext>
             </a:extLst>
           </p:cNvPr>
@@ -2896,7 +2896,7 @@
           <p:cNvPr id="6" name="Slide Number Placeholder 5">
             <a:extLst>
               <a:ext uri="{FF2B5EF4-FFF2-40B4-BE49-F238E27FC236}">
-                <a16:creationId xmlns:a16="http://schemas.microsoft.com/office/drawing/2014/main" id="{989E93C7-C431-FF49-9F1E-50370E87EAF4}"/>
+                <a16:creationId xmlns:a16="http://schemas.microsoft.com/office/drawing/2014/main" xmlns="" id="{989E93C7-C431-FF49-9F1E-50370E87EAF4}"/>
               </a:ext>
             </a:extLst>
           </p:cNvPr>
@@ -2957,7 +2957,7 @@
           <p:cNvPr id="2" name="Title 1">
             <a:extLst>
               <a:ext uri="{FF2B5EF4-FFF2-40B4-BE49-F238E27FC236}">
-                <a16:creationId xmlns:a16="http://schemas.microsoft.com/office/drawing/2014/main" id="{25D223C2-86FC-0A42-909F-C83D236CB55A}"/>
+                <a16:creationId xmlns:a16="http://schemas.microsoft.com/office/drawing/2014/main" xmlns="" id="{25D223C2-86FC-0A42-909F-C83D236CB55A}"/>
               </a:ext>
             </a:extLst>
           </p:cNvPr>
@@ -2986,7 +2986,7 @@
           <p:cNvPr id="3" name="Content Placeholder 2">
             <a:extLst>
               <a:ext uri="{FF2B5EF4-FFF2-40B4-BE49-F238E27FC236}">
-                <a16:creationId xmlns:a16="http://schemas.microsoft.com/office/drawing/2014/main" id="{3D695E68-BF1F-7D4E-8E1F-2E385C466AE3}"/>
+                <a16:creationId xmlns:a16="http://schemas.microsoft.com/office/drawing/2014/main" xmlns="" id="{3D695E68-BF1F-7D4E-8E1F-2E385C466AE3}"/>
               </a:ext>
             </a:extLst>
           </p:cNvPr>
@@ -3049,7 +3049,7 @@
           <p:cNvPr id="4" name="Content Placeholder 3">
             <a:extLst>
               <a:ext uri="{FF2B5EF4-FFF2-40B4-BE49-F238E27FC236}">
-                <a16:creationId xmlns:a16="http://schemas.microsoft.com/office/drawing/2014/main" id="{82EA8D4D-3BF1-1E41-81DD-D83520003729}"/>
+                <a16:creationId xmlns:a16="http://schemas.microsoft.com/office/drawing/2014/main" xmlns="" id="{82EA8D4D-3BF1-1E41-81DD-D83520003729}"/>
               </a:ext>
             </a:extLst>
           </p:cNvPr>
@@ -3112,7 +3112,7 @@
           <p:cNvPr id="5" name="Date Placeholder 4">
             <a:extLst>
               <a:ext uri="{FF2B5EF4-FFF2-40B4-BE49-F238E27FC236}">
-                <a16:creationId xmlns:a16="http://schemas.microsoft.com/office/drawing/2014/main" id="{E1DC3763-4381-4649-B640-7760530AB9A7}"/>
+                <a16:creationId xmlns:a16="http://schemas.microsoft.com/office/drawing/2014/main" xmlns="" id="{E1DC3763-4381-4649-B640-7760530AB9A7}"/>
               </a:ext>
             </a:extLst>
           </p:cNvPr>
@@ -3137,7 +3137,7 @@
           <p:cNvPr id="6" name="Footer Placeholder 5">
             <a:extLst>
               <a:ext uri="{FF2B5EF4-FFF2-40B4-BE49-F238E27FC236}">
-                <a16:creationId xmlns:a16="http://schemas.microsoft.com/office/drawing/2014/main" id="{281670BC-43ED-FD4B-B0AA-642B28A7D139}"/>
+                <a16:creationId xmlns:a16="http://schemas.microsoft.com/office/drawing/2014/main" xmlns="" id="{281670BC-43ED-FD4B-B0AA-642B28A7D139}"/>
               </a:ext>
             </a:extLst>
           </p:cNvPr>
@@ -3169,7 +3169,7 @@
           <p:cNvPr id="7" name="Slide Number Placeholder 6">
             <a:extLst>
               <a:ext uri="{FF2B5EF4-FFF2-40B4-BE49-F238E27FC236}">
-                <a16:creationId xmlns:a16="http://schemas.microsoft.com/office/drawing/2014/main" id="{5924FB5B-8BDC-8C42-8823-CBEEB8F8D57B}"/>
+                <a16:creationId xmlns:a16="http://schemas.microsoft.com/office/drawing/2014/main" xmlns="" id="{5924FB5B-8BDC-8C42-8823-CBEEB8F8D57B}"/>
               </a:ext>
             </a:extLst>
           </p:cNvPr>
@@ -3230,7 +3230,7 @@
           <p:cNvPr id="2" name="Title 1">
             <a:extLst>
               <a:ext uri="{FF2B5EF4-FFF2-40B4-BE49-F238E27FC236}">
-                <a16:creationId xmlns:a16="http://schemas.microsoft.com/office/drawing/2014/main" id="{5765E3C7-1257-6841-8F07-258F47AD3C15}"/>
+                <a16:creationId xmlns:a16="http://schemas.microsoft.com/office/drawing/2014/main" xmlns="" id="{5765E3C7-1257-6841-8F07-258F47AD3C15}"/>
               </a:ext>
             </a:extLst>
           </p:cNvPr>
@@ -3264,7 +3264,7 @@
           <p:cNvPr id="3" name="Text Placeholder 2">
             <a:extLst>
               <a:ext uri="{FF2B5EF4-FFF2-40B4-BE49-F238E27FC236}">
-                <a16:creationId xmlns:a16="http://schemas.microsoft.com/office/drawing/2014/main" id="{3D4AD9FD-A8D1-E243-97EF-C05B95F77A7E}"/>
+                <a16:creationId xmlns:a16="http://schemas.microsoft.com/office/drawing/2014/main" xmlns="" id="{3D4AD9FD-A8D1-E243-97EF-C05B95F77A7E}"/>
               </a:ext>
             </a:extLst>
           </p:cNvPr>
@@ -3335,7 +3335,7 @@
           <p:cNvPr id="4" name="Content Placeholder 3">
             <a:extLst>
               <a:ext uri="{FF2B5EF4-FFF2-40B4-BE49-F238E27FC236}">
-                <a16:creationId xmlns:a16="http://schemas.microsoft.com/office/drawing/2014/main" id="{59922683-C983-0D4E-BC24-37938865E12E}"/>
+                <a16:creationId xmlns:a16="http://schemas.microsoft.com/office/drawing/2014/main" xmlns="" id="{59922683-C983-0D4E-BC24-37938865E12E}"/>
               </a:ext>
             </a:extLst>
           </p:cNvPr>
@@ -3398,7 +3398,7 @@
           <p:cNvPr id="5" name="Text Placeholder 4">
             <a:extLst>
               <a:ext uri="{FF2B5EF4-FFF2-40B4-BE49-F238E27FC236}">
-                <a16:creationId xmlns:a16="http://schemas.microsoft.com/office/drawing/2014/main" id="{FB774BEE-784D-B34B-9F4C-F639B4CF621D}"/>
+                <a16:creationId xmlns:a16="http://schemas.microsoft.com/office/drawing/2014/main" xmlns="" id="{FB774BEE-784D-B34B-9F4C-F639B4CF621D}"/>
               </a:ext>
             </a:extLst>
           </p:cNvPr>
@@ -3469,7 +3469,7 @@
           <p:cNvPr id="6" name="Content Placeholder 5">
             <a:extLst>
               <a:ext uri="{FF2B5EF4-FFF2-40B4-BE49-F238E27FC236}">
-                <a16:creationId xmlns:a16="http://schemas.microsoft.com/office/drawing/2014/main" id="{3A0333E1-6DA5-764A-B08D-401D3A50BE86}"/>
+                <a16:creationId xmlns:a16="http://schemas.microsoft.com/office/drawing/2014/main" xmlns="" id="{3A0333E1-6DA5-764A-B08D-401D3A50BE86}"/>
               </a:ext>
             </a:extLst>
           </p:cNvPr>
@@ -3532,7 +3532,7 @@
           <p:cNvPr id="7" name="Date Placeholder 6">
             <a:extLst>
               <a:ext uri="{FF2B5EF4-FFF2-40B4-BE49-F238E27FC236}">
-                <a16:creationId xmlns:a16="http://schemas.microsoft.com/office/drawing/2014/main" id="{88B024D0-B07B-9D43-8D0C-7216397FBD10}"/>
+                <a16:creationId xmlns:a16="http://schemas.microsoft.com/office/drawing/2014/main" xmlns="" id="{88B024D0-B07B-9D43-8D0C-7216397FBD10}"/>
               </a:ext>
             </a:extLst>
           </p:cNvPr>
@@ -3557,7 +3557,7 @@
           <p:cNvPr id="8" name="Footer Placeholder 7">
             <a:extLst>
               <a:ext uri="{FF2B5EF4-FFF2-40B4-BE49-F238E27FC236}">
-                <a16:creationId xmlns:a16="http://schemas.microsoft.com/office/drawing/2014/main" id="{16E003CF-1120-424F-9810-1EA67F40DBD3}"/>
+                <a16:creationId xmlns:a16="http://schemas.microsoft.com/office/drawing/2014/main" xmlns="" id="{16E003CF-1120-424F-9810-1EA67F40DBD3}"/>
               </a:ext>
             </a:extLst>
           </p:cNvPr>
@@ -3589,7 +3589,7 @@
           <p:cNvPr id="9" name="Slide Number Placeholder 8">
             <a:extLst>
               <a:ext uri="{FF2B5EF4-FFF2-40B4-BE49-F238E27FC236}">
-                <a16:creationId xmlns:a16="http://schemas.microsoft.com/office/drawing/2014/main" id="{779E23C2-2C0C-5047-B480-646B687B70B5}"/>
+                <a16:creationId xmlns:a16="http://schemas.microsoft.com/office/drawing/2014/main" xmlns="" id="{779E23C2-2C0C-5047-B480-646B687B70B5}"/>
               </a:ext>
             </a:extLst>
           </p:cNvPr>
@@ -3650,7 +3650,7 @@
           <p:cNvPr id="2" name="Title 1">
             <a:extLst>
               <a:ext uri="{FF2B5EF4-FFF2-40B4-BE49-F238E27FC236}">
-                <a16:creationId xmlns:a16="http://schemas.microsoft.com/office/drawing/2014/main" id="{8BABAE61-B625-D24A-8720-D162175E6B86}"/>
+                <a16:creationId xmlns:a16="http://schemas.microsoft.com/office/drawing/2014/main" xmlns="" id="{8BABAE61-B625-D24A-8720-D162175E6B86}"/>
               </a:ext>
             </a:extLst>
           </p:cNvPr>
@@ -3679,7 +3679,7 @@
           <p:cNvPr id="3" name="Date Placeholder 2">
             <a:extLst>
               <a:ext uri="{FF2B5EF4-FFF2-40B4-BE49-F238E27FC236}">
-                <a16:creationId xmlns:a16="http://schemas.microsoft.com/office/drawing/2014/main" id="{6534163C-4D8B-C549-BA44-E4E3C6D77EA8}"/>
+                <a16:creationId xmlns:a16="http://schemas.microsoft.com/office/drawing/2014/main" xmlns="" id="{6534163C-4D8B-C549-BA44-E4E3C6D77EA8}"/>
               </a:ext>
             </a:extLst>
           </p:cNvPr>
@@ -3704,7 +3704,7 @@
           <p:cNvPr id="4" name="Footer Placeholder 3">
             <a:extLst>
               <a:ext uri="{FF2B5EF4-FFF2-40B4-BE49-F238E27FC236}">
-                <a16:creationId xmlns:a16="http://schemas.microsoft.com/office/drawing/2014/main" id="{21E087B1-5545-1D47-804A-BDC69484BDE1}"/>
+                <a16:creationId xmlns:a16="http://schemas.microsoft.com/office/drawing/2014/main" xmlns="" id="{21E087B1-5545-1D47-804A-BDC69484BDE1}"/>
               </a:ext>
             </a:extLst>
           </p:cNvPr>
@@ -3736,7 +3736,7 @@
           <p:cNvPr id="5" name="Slide Number Placeholder 4">
             <a:extLst>
               <a:ext uri="{FF2B5EF4-FFF2-40B4-BE49-F238E27FC236}">
-                <a16:creationId xmlns:a16="http://schemas.microsoft.com/office/drawing/2014/main" id="{13D3ABFE-4B5A-9B4C-88CB-4DF13F53D1DA}"/>
+                <a16:creationId xmlns:a16="http://schemas.microsoft.com/office/drawing/2014/main" xmlns="" id="{13D3ABFE-4B5A-9B4C-88CB-4DF13F53D1DA}"/>
               </a:ext>
             </a:extLst>
           </p:cNvPr>
@@ -3797,7 +3797,7 @@
           <p:cNvPr id="2" name="Date Placeholder 1">
             <a:extLst>
               <a:ext uri="{FF2B5EF4-FFF2-40B4-BE49-F238E27FC236}">
-                <a16:creationId xmlns:a16="http://schemas.microsoft.com/office/drawing/2014/main" id="{075CB7FC-54E7-7A40-B7D5-73D554E3AA97}"/>
+                <a16:creationId xmlns:a16="http://schemas.microsoft.com/office/drawing/2014/main" xmlns="" id="{075CB7FC-54E7-7A40-B7D5-73D554E3AA97}"/>
               </a:ext>
             </a:extLst>
           </p:cNvPr>
@@ -3822,7 +3822,7 @@
           <p:cNvPr id="3" name="Footer Placeholder 2">
             <a:extLst>
               <a:ext uri="{FF2B5EF4-FFF2-40B4-BE49-F238E27FC236}">
-                <a16:creationId xmlns:a16="http://schemas.microsoft.com/office/drawing/2014/main" id="{294232C9-5DE4-6A43-A516-FE8FF89E110A}"/>
+                <a16:creationId xmlns:a16="http://schemas.microsoft.com/office/drawing/2014/main" xmlns="" id="{294232C9-5DE4-6A43-A516-FE8FF89E110A}"/>
               </a:ext>
             </a:extLst>
           </p:cNvPr>
@@ -3854,7 +3854,7 @@
           <p:cNvPr id="4" name="Slide Number Placeholder 3">
             <a:extLst>
               <a:ext uri="{FF2B5EF4-FFF2-40B4-BE49-F238E27FC236}">
-                <a16:creationId xmlns:a16="http://schemas.microsoft.com/office/drawing/2014/main" id="{4F12EDD8-8466-8041-96C9-BC268A77C491}"/>
+                <a16:creationId xmlns:a16="http://schemas.microsoft.com/office/drawing/2014/main" xmlns="" id="{4F12EDD8-8466-8041-96C9-BC268A77C491}"/>
               </a:ext>
             </a:extLst>
           </p:cNvPr>
@@ -3915,7 +3915,7 @@
           <p:cNvPr id="2" name="Title 1">
             <a:extLst>
               <a:ext uri="{FF2B5EF4-FFF2-40B4-BE49-F238E27FC236}">
-                <a16:creationId xmlns:a16="http://schemas.microsoft.com/office/drawing/2014/main" id="{C3A79BB0-E229-9C48-8922-B5CE3FF891F4}"/>
+                <a16:creationId xmlns:a16="http://schemas.microsoft.com/office/drawing/2014/main" xmlns="" id="{C3A79BB0-E229-9C48-8922-B5CE3FF891F4}"/>
               </a:ext>
             </a:extLst>
           </p:cNvPr>
@@ -3953,7 +3953,7 @@
           <p:cNvPr id="3" name="Content Placeholder 2">
             <a:extLst>
               <a:ext uri="{FF2B5EF4-FFF2-40B4-BE49-F238E27FC236}">
-                <a16:creationId xmlns:a16="http://schemas.microsoft.com/office/drawing/2014/main" id="{80A89A6F-D7FF-4344-9F7F-11B6092E2A0A}"/>
+                <a16:creationId xmlns:a16="http://schemas.microsoft.com/office/drawing/2014/main" xmlns="" id="{80A89A6F-D7FF-4344-9F7F-11B6092E2A0A}"/>
               </a:ext>
             </a:extLst>
           </p:cNvPr>
@@ -4044,7 +4044,7 @@
           <p:cNvPr id="4" name="Text Placeholder 3">
             <a:extLst>
               <a:ext uri="{FF2B5EF4-FFF2-40B4-BE49-F238E27FC236}">
-                <a16:creationId xmlns:a16="http://schemas.microsoft.com/office/drawing/2014/main" id="{627DFF4C-91FA-4B46-9380-236014DEC005}"/>
+                <a16:creationId xmlns:a16="http://schemas.microsoft.com/office/drawing/2014/main" xmlns="" id="{627DFF4C-91FA-4B46-9380-236014DEC005}"/>
               </a:ext>
             </a:extLst>
           </p:cNvPr>
@@ -4115,7 +4115,7 @@
           <p:cNvPr id="5" name="Date Placeholder 4">
             <a:extLst>
               <a:ext uri="{FF2B5EF4-FFF2-40B4-BE49-F238E27FC236}">
-                <a16:creationId xmlns:a16="http://schemas.microsoft.com/office/drawing/2014/main" id="{364CC20E-84B3-4140-A42C-C4BBE65BB597}"/>
+                <a16:creationId xmlns:a16="http://schemas.microsoft.com/office/drawing/2014/main" xmlns="" id="{364CC20E-84B3-4140-A42C-C4BBE65BB597}"/>
               </a:ext>
             </a:extLst>
           </p:cNvPr>
@@ -4140,7 +4140,7 @@
           <p:cNvPr id="6" name="Footer Placeholder 5">
             <a:extLst>
               <a:ext uri="{FF2B5EF4-FFF2-40B4-BE49-F238E27FC236}">
-                <a16:creationId xmlns:a16="http://schemas.microsoft.com/office/drawing/2014/main" id="{0892FC6D-70E4-F848-9B7F-A43556BECBEC}"/>
+                <a16:creationId xmlns:a16="http://schemas.microsoft.com/office/drawing/2014/main" xmlns="" id="{0892FC6D-70E4-F848-9B7F-A43556BECBEC}"/>
               </a:ext>
             </a:extLst>
           </p:cNvPr>
@@ -4172,7 +4172,7 @@
           <p:cNvPr id="7" name="Slide Number Placeholder 6">
             <a:extLst>
               <a:ext uri="{FF2B5EF4-FFF2-40B4-BE49-F238E27FC236}">
-                <a16:creationId xmlns:a16="http://schemas.microsoft.com/office/drawing/2014/main" id="{48226A94-F9C2-4846-89B3-88F48B2CBF29}"/>
+                <a16:creationId xmlns:a16="http://schemas.microsoft.com/office/drawing/2014/main" xmlns="" id="{48226A94-F9C2-4846-89B3-88F48B2CBF29}"/>
               </a:ext>
             </a:extLst>
           </p:cNvPr>
@@ -4233,7 +4233,7 @@
           <p:cNvPr id="2" name="Title 1">
             <a:extLst>
               <a:ext uri="{FF2B5EF4-FFF2-40B4-BE49-F238E27FC236}">
-                <a16:creationId xmlns:a16="http://schemas.microsoft.com/office/drawing/2014/main" id="{CF6E7583-187B-3342-AE30-EFA9FF3681ED}"/>
+                <a16:creationId xmlns:a16="http://schemas.microsoft.com/office/drawing/2014/main" xmlns="" id="{CF6E7583-187B-3342-AE30-EFA9FF3681ED}"/>
               </a:ext>
             </a:extLst>
           </p:cNvPr>
@@ -4271,7 +4271,7 @@
           <p:cNvPr id="3" name="Picture Placeholder 2">
             <a:extLst>
               <a:ext uri="{FF2B5EF4-FFF2-40B4-BE49-F238E27FC236}">
-                <a16:creationId xmlns:a16="http://schemas.microsoft.com/office/drawing/2014/main" id="{CC5A585B-7FD1-5241-89A9-11BC92E501BA}"/>
+                <a16:creationId xmlns:a16="http://schemas.microsoft.com/office/drawing/2014/main" xmlns="" id="{CC5A585B-7FD1-5241-89A9-11BC92E501BA}"/>
               </a:ext>
             </a:extLst>
           </p:cNvPr>
@@ -4338,7 +4338,7 @@
           <p:cNvPr id="4" name="Text Placeholder 3">
             <a:extLst>
               <a:ext uri="{FF2B5EF4-FFF2-40B4-BE49-F238E27FC236}">
-                <a16:creationId xmlns:a16="http://schemas.microsoft.com/office/drawing/2014/main" id="{60204E7D-E169-574F-A5B7-AD6CA2184CB1}"/>
+                <a16:creationId xmlns:a16="http://schemas.microsoft.com/office/drawing/2014/main" xmlns="" id="{60204E7D-E169-574F-A5B7-AD6CA2184CB1}"/>
               </a:ext>
             </a:extLst>
           </p:cNvPr>
@@ -4409,7 +4409,7 @@
           <p:cNvPr id="5" name="Date Placeholder 4">
             <a:extLst>
               <a:ext uri="{FF2B5EF4-FFF2-40B4-BE49-F238E27FC236}">
-                <a16:creationId xmlns:a16="http://schemas.microsoft.com/office/drawing/2014/main" id="{BEF5938D-AD0F-1048-941A-1904C2BA2A9D}"/>
+                <a16:creationId xmlns:a16="http://schemas.microsoft.com/office/drawing/2014/main" xmlns="" id="{BEF5938D-AD0F-1048-941A-1904C2BA2A9D}"/>
               </a:ext>
             </a:extLst>
           </p:cNvPr>
@@ -4434,7 +4434,7 @@
           <p:cNvPr id="6" name="Footer Placeholder 5">
             <a:extLst>
               <a:ext uri="{FF2B5EF4-FFF2-40B4-BE49-F238E27FC236}">
-                <a16:creationId xmlns:a16="http://schemas.microsoft.com/office/drawing/2014/main" id="{6CDBA098-E454-9B4E-8DDB-234CA250F9A7}"/>
+                <a16:creationId xmlns:a16="http://schemas.microsoft.com/office/drawing/2014/main" xmlns="" id="{6CDBA098-E454-9B4E-8DDB-234CA250F9A7}"/>
               </a:ext>
             </a:extLst>
           </p:cNvPr>
@@ -4466,7 +4466,7 @@
           <p:cNvPr id="7" name="Slide Number Placeholder 6">
             <a:extLst>
               <a:ext uri="{FF2B5EF4-FFF2-40B4-BE49-F238E27FC236}">
-                <a16:creationId xmlns:a16="http://schemas.microsoft.com/office/drawing/2014/main" id="{2E17B4A4-52B3-A54E-B30E-BE0D9072F7CA}"/>
+                <a16:creationId xmlns:a16="http://schemas.microsoft.com/office/drawing/2014/main" xmlns="" id="{2E17B4A4-52B3-A54E-B30E-BE0D9072F7CA}"/>
               </a:ext>
             </a:extLst>
           </p:cNvPr>
@@ -4532,7 +4532,7 @@
           <p:cNvPr id="2" name="Title Placeholder 1">
             <a:extLst>
               <a:ext uri="{FF2B5EF4-FFF2-40B4-BE49-F238E27FC236}">
-                <a16:creationId xmlns:a16="http://schemas.microsoft.com/office/drawing/2014/main" id="{3E30EEE8-0546-9D42-B72A-41B33FF8F481}"/>
+                <a16:creationId xmlns:a16="http://schemas.microsoft.com/office/drawing/2014/main" xmlns="" id="{3E30EEE8-0546-9D42-B72A-41B33FF8F481}"/>
               </a:ext>
             </a:extLst>
           </p:cNvPr>
@@ -4571,7 +4571,7 @@
           <p:cNvPr id="3" name="Text Placeholder 2">
             <a:extLst>
               <a:ext uri="{FF2B5EF4-FFF2-40B4-BE49-F238E27FC236}">
-                <a16:creationId xmlns:a16="http://schemas.microsoft.com/office/drawing/2014/main" id="{A02B62E4-E345-044F-9307-7C54BE74A98E}"/>
+                <a16:creationId xmlns:a16="http://schemas.microsoft.com/office/drawing/2014/main" xmlns="" id="{A02B62E4-E345-044F-9307-7C54BE74A98E}"/>
               </a:ext>
             </a:extLst>
           </p:cNvPr>
@@ -4639,7 +4639,7 @@
           <p:cNvPr id="4" name="Date Placeholder 3">
             <a:extLst>
               <a:ext uri="{FF2B5EF4-FFF2-40B4-BE49-F238E27FC236}">
-                <a16:creationId xmlns:a16="http://schemas.microsoft.com/office/drawing/2014/main" id="{0BF80B71-E089-DA46-9462-077BA3BBB678}"/>
+                <a16:creationId xmlns:a16="http://schemas.microsoft.com/office/drawing/2014/main" xmlns="" id="{0BF80B71-E089-DA46-9462-077BA3BBB678}"/>
               </a:ext>
             </a:extLst>
           </p:cNvPr>
@@ -4682,7 +4682,7 @@
           <p:cNvPr id="5" name="Footer Placeholder 4">
             <a:extLst>
               <a:ext uri="{FF2B5EF4-FFF2-40B4-BE49-F238E27FC236}">
-                <a16:creationId xmlns:a16="http://schemas.microsoft.com/office/drawing/2014/main" id="{025E66DA-9D98-614E-BDFA-04C2DC34A894}"/>
+                <a16:creationId xmlns:a16="http://schemas.microsoft.com/office/drawing/2014/main" xmlns="" id="{025E66DA-9D98-614E-BDFA-04C2DC34A894}"/>
               </a:ext>
             </a:extLst>
           </p:cNvPr>
@@ -4732,7 +4732,7 @@
           <p:cNvPr id="6" name="Slide Number Placeholder 5">
             <a:extLst>
               <a:ext uri="{FF2B5EF4-FFF2-40B4-BE49-F238E27FC236}">
-                <a16:creationId xmlns:a16="http://schemas.microsoft.com/office/drawing/2014/main" id="{2BE682B4-F77B-224A-8BEF-A5868A1DE16E}"/>
+                <a16:creationId xmlns:a16="http://schemas.microsoft.com/office/drawing/2014/main" xmlns="" id="{2BE682B4-F77B-224A-8BEF-A5868A1DE16E}"/>
               </a:ext>
             </a:extLst>
           </p:cNvPr>
@@ -5260,10 +5260,10 @@
       </p:sp>
       <p:pic>
         <p:nvPicPr>
-          <p:cNvPr id="3" name="Picture 2" descr="A picture containing text&#13;&#10;&#13;&#10;Description automatically generated">
-            <a:extLst>
-              <a:ext uri="{FF2B5EF4-FFF2-40B4-BE49-F238E27FC236}">
-                <a16:creationId xmlns:a16="http://schemas.microsoft.com/office/drawing/2014/main" id="{7DF18163-3A07-0D49-A3B4-C83151E362D0}"/>
+          <p:cNvPr id="3" name="Picture 2" descr="A picture containing text&#10;&#10;Description automatically generated">
+            <a:extLst>
+              <a:ext uri="{FF2B5EF4-FFF2-40B4-BE49-F238E27FC236}">
+                <a16:creationId xmlns:a16="http://schemas.microsoft.com/office/drawing/2014/main" xmlns="" id="{7DF18163-3A07-0D49-A3B4-C83151E362D0}"/>
               </a:ext>
             </a:extLst>
           </p:cNvPr>
@@ -5336,7 +5336,7 @@
           <p:cNvPr id="4" name="Footer Placeholder 3">
             <a:extLst>
               <a:ext uri="{FF2B5EF4-FFF2-40B4-BE49-F238E27FC236}">
-                <a16:creationId xmlns:a16="http://schemas.microsoft.com/office/drawing/2014/main" id="{31A61243-E0C8-432F-9884-8DC8017CD83A}"/>
+                <a16:creationId xmlns:a16="http://schemas.microsoft.com/office/drawing/2014/main" xmlns="" id="{31A61243-E0C8-432F-9884-8DC8017CD83A}"/>
               </a:ext>
             </a:extLst>
           </p:cNvPr>
@@ -5365,10 +5365,10 @@
       </p:sp>
       <p:pic>
         <p:nvPicPr>
-          <p:cNvPr id="8" name="Picture 7" descr="A screenshot of a computer&#13;&#10;&#13;&#10;Description automatically generated">
-            <a:extLst>
-              <a:ext uri="{FF2B5EF4-FFF2-40B4-BE49-F238E27FC236}">
-                <a16:creationId xmlns:a16="http://schemas.microsoft.com/office/drawing/2014/main" id="{4F227F46-130C-0948-8AEB-2EF15E668ACD}"/>
+          <p:cNvPr id="8" name="Picture 7" descr="A screenshot of a computer&#10;&#10;Description automatically generated">
+            <a:extLst>
+              <a:ext uri="{FF2B5EF4-FFF2-40B4-BE49-F238E27FC236}">
+                <a16:creationId xmlns:a16="http://schemas.microsoft.com/office/drawing/2014/main" xmlns="" id="{4F227F46-130C-0948-8AEB-2EF15E668ACD}"/>
               </a:ext>
             </a:extLst>
           </p:cNvPr>
@@ -5404,7 +5404,7 @@
           <p:cNvPr id="9" name="Rectangle 8">
             <a:extLst>
               <a:ext uri="{FF2B5EF4-FFF2-40B4-BE49-F238E27FC236}">
-                <a16:creationId xmlns:a16="http://schemas.microsoft.com/office/drawing/2014/main" id="{88E6AD45-76C6-9041-AC02-EE2010020080}"/>
+                <a16:creationId xmlns:a16="http://schemas.microsoft.com/office/drawing/2014/main" xmlns="" id="{88E6AD45-76C6-9041-AC02-EE2010020080}"/>
               </a:ext>
             </a:extLst>
           </p:cNvPr>
@@ -5439,7 +5439,7 @@
           <p:cNvPr id="10" name="Footer Placeholder 3">
             <a:extLst>
               <a:ext uri="{FF2B5EF4-FFF2-40B4-BE49-F238E27FC236}">
-                <a16:creationId xmlns:a16="http://schemas.microsoft.com/office/drawing/2014/main" id="{DD0F717B-0D9D-FD48-8992-A9883B5557D8}"/>
+                <a16:creationId xmlns:a16="http://schemas.microsoft.com/office/drawing/2014/main" xmlns="" id="{DD0F717B-0D9D-FD48-8992-A9883B5557D8}"/>
               </a:ext>
             </a:extLst>
           </p:cNvPr>
@@ -5587,10 +5587,10 @@
       </p:sp>
       <p:pic>
         <p:nvPicPr>
-          <p:cNvPr id="11" name="Picture 10" descr="A picture containing text&#13;&#10;&#13;&#10;Description automatically generated">
-            <a:extLst>
-              <a:ext uri="{FF2B5EF4-FFF2-40B4-BE49-F238E27FC236}">
-                <a16:creationId xmlns:a16="http://schemas.microsoft.com/office/drawing/2014/main" id="{04F896BE-DD3B-6842-A102-23A13A01C67F}"/>
+          <p:cNvPr id="11" name="Picture 10" descr="A picture containing text&#10;&#10;Description automatically generated">
+            <a:extLst>
+              <a:ext uri="{FF2B5EF4-FFF2-40B4-BE49-F238E27FC236}">
+                <a16:creationId xmlns:a16="http://schemas.microsoft.com/office/drawing/2014/main" xmlns="" id="{04F896BE-DD3B-6842-A102-23A13A01C67F}"/>
               </a:ext>
             </a:extLst>
           </p:cNvPr>
@@ -5656,10 +5656,10 @@
       </p:grpSpPr>
       <p:pic>
         <p:nvPicPr>
-          <p:cNvPr id="6" name="Picture 5" descr="A screenshot of a cell phone&#13;&#10;&#13;&#10;Description automatically generated">
-            <a:extLst>
-              <a:ext uri="{FF2B5EF4-FFF2-40B4-BE49-F238E27FC236}">
-                <a16:creationId xmlns:a16="http://schemas.microsoft.com/office/drawing/2014/main" id="{5E0912F7-BE9A-7E4D-B782-A3603BDD6DCB}"/>
+          <p:cNvPr id="6" name="Picture 5" descr="A screenshot of a cell phone&#10;&#10;Description automatically generated">
+            <a:extLst>
+              <a:ext uri="{FF2B5EF4-FFF2-40B4-BE49-F238E27FC236}">
+                <a16:creationId xmlns:a16="http://schemas.microsoft.com/office/drawing/2014/main" xmlns="" id="{5E0912F7-BE9A-7E4D-B782-A3603BDD6DCB}"/>
               </a:ext>
             </a:extLst>
           </p:cNvPr>
@@ -5695,7 +5695,7 @@
           <p:cNvPr id="9" name="Rectangle 8">
             <a:extLst>
               <a:ext uri="{FF2B5EF4-FFF2-40B4-BE49-F238E27FC236}">
-                <a16:creationId xmlns:a16="http://schemas.microsoft.com/office/drawing/2014/main" id="{81EF83F8-F894-554C-9F11-0E6C6E73ED1C}"/>
+                <a16:creationId xmlns:a16="http://schemas.microsoft.com/office/drawing/2014/main" xmlns="" id="{81EF83F8-F894-554C-9F11-0E6C6E73ED1C}"/>
               </a:ext>
             </a:extLst>
           </p:cNvPr>
@@ -5730,7 +5730,7 @@
           <p:cNvPr id="11" name="Footer Placeholder 3">
             <a:extLst>
               <a:ext uri="{FF2B5EF4-FFF2-40B4-BE49-F238E27FC236}">
-                <a16:creationId xmlns:a16="http://schemas.microsoft.com/office/drawing/2014/main" id="{96A46EBC-4006-2944-9AC4-B0751FD56A03}"/>
+                <a16:creationId xmlns:a16="http://schemas.microsoft.com/office/drawing/2014/main" xmlns="" id="{96A46EBC-4006-2944-9AC4-B0751FD56A03}"/>
               </a:ext>
             </a:extLst>
           </p:cNvPr>
@@ -5878,10 +5878,10 @@
       </p:sp>
       <p:pic>
         <p:nvPicPr>
-          <p:cNvPr id="12" name="Picture 11" descr="A picture containing text&#13;&#10;&#13;&#10;Description automatically generated">
-            <a:extLst>
-              <a:ext uri="{FF2B5EF4-FFF2-40B4-BE49-F238E27FC236}">
-                <a16:creationId xmlns:a16="http://schemas.microsoft.com/office/drawing/2014/main" id="{2337C49C-B862-FF43-964B-0F3A9DC1D327}"/>
+          <p:cNvPr id="12" name="Picture 11" descr="A picture containing text&#10;&#10;Description automatically generated">
+            <a:extLst>
+              <a:ext uri="{FF2B5EF4-FFF2-40B4-BE49-F238E27FC236}">
+                <a16:creationId xmlns:a16="http://schemas.microsoft.com/office/drawing/2014/main" xmlns="" id="{2337C49C-B862-FF43-964B-0F3A9DC1D327}"/>
               </a:ext>
             </a:extLst>
           </p:cNvPr>
@@ -5950,7 +5950,7 @@
           <p:cNvPr id="11" name="Rectangle 10">
             <a:extLst>
               <a:ext uri="{FF2B5EF4-FFF2-40B4-BE49-F238E27FC236}">
-                <a16:creationId xmlns:a16="http://schemas.microsoft.com/office/drawing/2014/main" id="{5D403310-84C0-204E-A50A-1755917A98CE}"/>
+                <a16:creationId xmlns:a16="http://schemas.microsoft.com/office/drawing/2014/main" xmlns="" id="{5D403310-84C0-204E-A50A-1755917A98CE}"/>
               </a:ext>
             </a:extLst>
           </p:cNvPr>
@@ -5982,10 +5982,10 @@
       </p:sp>
       <p:pic>
         <p:nvPicPr>
-          <p:cNvPr id="13" name="Picture 12" descr="A screenshot of a cell phone&#13;&#10;&#13;&#10;Description automatically generated">
-            <a:extLst>
-              <a:ext uri="{FF2B5EF4-FFF2-40B4-BE49-F238E27FC236}">
-                <a16:creationId xmlns:a16="http://schemas.microsoft.com/office/drawing/2014/main" id="{E3E1648E-0587-5E47-A790-FE32FAA4EC30}"/>
+          <p:cNvPr id="13" name="Picture 12" descr="A screenshot of a cell phone&#10;&#10;Description automatically generated">
+            <a:extLst>
+              <a:ext uri="{FF2B5EF4-FFF2-40B4-BE49-F238E27FC236}">
+                <a16:creationId xmlns:a16="http://schemas.microsoft.com/office/drawing/2014/main" xmlns="" id="{E3E1648E-0587-5E47-A790-FE32FAA4EC30}"/>
               </a:ext>
             </a:extLst>
           </p:cNvPr>
@@ -6021,7 +6021,7 @@
           <p:cNvPr id="14" name="Footer Placeholder 3">
             <a:extLst>
               <a:ext uri="{FF2B5EF4-FFF2-40B4-BE49-F238E27FC236}">
-                <a16:creationId xmlns:a16="http://schemas.microsoft.com/office/drawing/2014/main" id="{83C9CBCC-06ED-AF49-A805-B48C5C4D66F5}"/>
+                <a16:creationId xmlns:a16="http://schemas.microsoft.com/office/drawing/2014/main" xmlns="" id="{83C9CBCC-06ED-AF49-A805-B48C5C4D66F5}"/>
               </a:ext>
             </a:extLst>
           </p:cNvPr>
@@ -6169,10 +6169,10 @@
       </p:sp>
       <p:pic>
         <p:nvPicPr>
-          <p:cNvPr id="15" name="Picture 14" descr="A picture containing text&#13;&#10;&#13;&#10;Description automatically generated">
-            <a:extLst>
-              <a:ext uri="{FF2B5EF4-FFF2-40B4-BE49-F238E27FC236}">
-                <a16:creationId xmlns:a16="http://schemas.microsoft.com/office/drawing/2014/main" id="{33DC0DAC-4EE9-174F-851C-A882C5E8DA4C}"/>
+          <p:cNvPr id="15" name="Picture 14" descr="A picture containing text&#10;&#10;Description automatically generated">
+            <a:extLst>
+              <a:ext uri="{FF2B5EF4-FFF2-40B4-BE49-F238E27FC236}">
+                <a16:creationId xmlns:a16="http://schemas.microsoft.com/office/drawing/2014/main" xmlns="" id="{33DC0DAC-4EE9-174F-851C-A882C5E8DA4C}"/>
               </a:ext>
             </a:extLst>
           </p:cNvPr>
@@ -6241,7 +6241,7 @@
           <p:cNvPr id="2" name="Title 1">
             <a:extLst>
               <a:ext uri="{FF2B5EF4-FFF2-40B4-BE49-F238E27FC236}">
-                <a16:creationId xmlns:a16="http://schemas.microsoft.com/office/drawing/2014/main" id="{C3854BB8-6CA7-4D0B-B200-C1AF7C8E62C6}"/>
+                <a16:creationId xmlns:a16="http://schemas.microsoft.com/office/drawing/2014/main" xmlns="" id="{C3854BB8-6CA7-4D0B-B200-C1AF7C8E62C6}"/>
               </a:ext>
             </a:extLst>
           </p:cNvPr>
@@ -6274,7 +6274,7 @@
           <p:cNvPr id="5" name="图片 4" descr="NewMainWindow.png">
             <a:extLst>
               <a:ext uri="{FF2B5EF4-FFF2-40B4-BE49-F238E27FC236}">
-                <a16:creationId xmlns:a16="http://schemas.microsoft.com/office/drawing/2014/main" id="{F235225B-35EB-49AA-A366-BC0384380638}"/>
+                <a16:creationId xmlns:a16="http://schemas.microsoft.com/office/drawing/2014/main" xmlns="" id="{F235225B-35EB-49AA-A366-BC0384380638}"/>
               </a:ext>
             </a:extLst>
           </p:cNvPr>
@@ -6306,7 +6306,7 @@
           <p:cNvPr id="6" name="Rectangle 5">
             <a:extLst>
               <a:ext uri="{FF2B5EF4-FFF2-40B4-BE49-F238E27FC236}">
-                <a16:creationId xmlns:a16="http://schemas.microsoft.com/office/drawing/2014/main" id="{36E5DB8A-7AD3-4DFE-89D4-6DFAD614706D}"/>
+                <a16:creationId xmlns:a16="http://schemas.microsoft.com/office/drawing/2014/main" xmlns="" id="{36E5DB8A-7AD3-4DFE-89D4-6DFAD614706D}"/>
               </a:ext>
             </a:extLst>
           </p:cNvPr>
@@ -6353,7 +6353,7 @@
           <p:cNvPr id="8" name="Straight Arrow Connector 7">
             <a:extLst>
               <a:ext uri="{FF2B5EF4-FFF2-40B4-BE49-F238E27FC236}">
-                <a16:creationId xmlns:a16="http://schemas.microsoft.com/office/drawing/2014/main" id="{C18A07CE-62F8-473D-A343-88328D428665}"/>
+                <a16:creationId xmlns:a16="http://schemas.microsoft.com/office/drawing/2014/main" xmlns="" id="{C18A07CE-62F8-473D-A343-88328D428665}"/>
               </a:ext>
             </a:extLst>
           </p:cNvPr>
@@ -6392,7 +6392,7 @@
           <p:cNvPr id="13" name="Rectangle 12">
             <a:extLst>
               <a:ext uri="{FF2B5EF4-FFF2-40B4-BE49-F238E27FC236}">
-                <a16:creationId xmlns:a16="http://schemas.microsoft.com/office/drawing/2014/main" id="{E86CFC87-9360-491F-9608-29BEC20D2B69}"/>
+                <a16:creationId xmlns:a16="http://schemas.microsoft.com/office/drawing/2014/main" xmlns="" id="{E86CFC87-9360-491F-9608-29BEC20D2B69}"/>
               </a:ext>
             </a:extLst>
           </p:cNvPr>
@@ -6439,7 +6439,7 @@
           <p:cNvPr id="15" name="Straight Arrow Connector 14">
             <a:extLst>
               <a:ext uri="{FF2B5EF4-FFF2-40B4-BE49-F238E27FC236}">
-                <a16:creationId xmlns:a16="http://schemas.microsoft.com/office/drawing/2014/main" id="{28345D34-1F99-4B83-863D-0ACF0178D262}"/>
+                <a16:creationId xmlns:a16="http://schemas.microsoft.com/office/drawing/2014/main" xmlns="" id="{28345D34-1F99-4B83-863D-0ACF0178D262}"/>
               </a:ext>
             </a:extLst>
           </p:cNvPr>
@@ -6478,7 +6478,7 @@
           <p:cNvPr id="16" name="Rectangle 15">
             <a:extLst>
               <a:ext uri="{FF2B5EF4-FFF2-40B4-BE49-F238E27FC236}">
-                <a16:creationId xmlns:a16="http://schemas.microsoft.com/office/drawing/2014/main" id="{BB9FA6F5-430A-4026-8189-9D68763BB8A2}"/>
+                <a16:creationId xmlns:a16="http://schemas.microsoft.com/office/drawing/2014/main" xmlns="" id="{BB9FA6F5-430A-4026-8189-9D68763BB8A2}"/>
               </a:ext>
             </a:extLst>
           </p:cNvPr>
@@ -6525,7 +6525,7 @@
           <p:cNvPr id="18" name="Straight Arrow Connector 17">
             <a:extLst>
               <a:ext uri="{FF2B5EF4-FFF2-40B4-BE49-F238E27FC236}">
-                <a16:creationId xmlns:a16="http://schemas.microsoft.com/office/drawing/2014/main" id="{6296735E-382E-48D2-A87B-7831BDC535EC}"/>
+                <a16:creationId xmlns:a16="http://schemas.microsoft.com/office/drawing/2014/main" xmlns="" id="{6296735E-382E-48D2-A87B-7831BDC535EC}"/>
               </a:ext>
             </a:extLst>
           </p:cNvPr>
@@ -6566,7 +6566,7 @@
           <p:cNvPr id="20" name="Rectangle 19">
             <a:extLst>
               <a:ext uri="{FF2B5EF4-FFF2-40B4-BE49-F238E27FC236}">
-                <a16:creationId xmlns:a16="http://schemas.microsoft.com/office/drawing/2014/main" id="{35780A92-037F-4DDF-9EF5-7312EB47BDF1}"/>
+                <a16:creationId xmlns:a16="http://schemas.microsoft.com/office/drawing/2014/main" xmlns="" id="{35780A92-037F-4DDF-9EF5-7312EB47BDF1}"/>
               </a:ext>
             </a:extLst>
           </p:cNvPr>
@@ -6613,7 +6613,7 @@
           <p:cNvPr id="22" name="Straight Arrow Connector 21">
             <a:extLst>
               <a:ext uri="{FF2B5EF4-FFF2-40B4-BE49-F238E27FC236}">
-                <a16:creationId xmlns:a16="http://schemas.microsoft.com/office/drawing/2014/main" id="{85DEA784-C3D7-4355-A40D-106A69843817}"/>
+                <a16:creationId xmlns:a16="http://schemas.microsoft.com/office/drawing/2014/main" xmlns="" id="{85DEA784-C3D7-4355-A40D-106A69843817}"/>
               </a:ext>
             </a:extLst>
           </p:cNvPr>
@@ -6654,7 +6654,7 @@
           <p:cNvPr id="27" name="TextBox 26">
             <a:extLst>
               <a:ext uri="{FF2B5EF4-FFF2-40B4-BE49-F238E27FC236}">
-                <a16:creationId xmlns:a16="http://schemas.microsoft.com/office/drawing/2014/main" id="{286B74C6-4070-4892-A19A-6FCF36432C15}"/>
+                <a16:creationId xmlns:a16="http://schemas.microsoft.com/office/drawing/2014/main" xmlns="" id="{286B74C6-4070-4892-A19A-6FCF36432C15}"/>
               </a:ext>
             </a:extLst>
           </p:cNvPr>
@@ -6689,7 +6689,7 @@
           <p:cNvPr id="28" name="TextBox 27">
             <a:extLst>
               <a:ext uri="{FF2B5EF4-FFF2-40B4-BE49-F238E27FC236}">
-                <a16:creationId xmlns:a16="http://schemas.microsoft.com/office/drawing/2014/main" id="{62AAB182-CE06-4A31-84E6-93086DD955EA}"/>
+                <a16:creationId xmlns:a16="http://schemas.microsoft.com/office/drawing/2014/main" xmlns="" id="{62AAB182-CE06-4A31-84E6-93086DD955EA}"/>
               </a:ext>
             </a:extLst>
           </p:cNvPr>
@@ -6724,7 +6724,7 @@
           <p:cNvPr id="30" name="Rectangle 29">
             <a:extLst>
               <a:ext uri="{FF2B5EF4-FFF2-40B4-BE49-F238E27FC236}">
-                <a16:creationId xmlns:a16="http://schemas.microsoft.com/office/drawing/2014/main" id="{641B204D-F41A-4AF2-9B99-7390B83AE595}"/>
+                <a16:creationId xmlns:a16="http://schemas.microsoft.com/office/drawing/2014/main" xmlns="" id="{641B204D-F41A-4AF2-9B99-7390B83AE595}"/>
               </a:ext>
             </a:extLst>
           </p:cNvPr>
@@ -6764,7 +6764,7 @@
           <p:cNvPr id="31" name="TextBox 30">
             <a:extLst>
               <a:ext uri="{FF2B5EF4-FFF2-40B4-BE49-F238E27FC236}">
-                <a16:creationId xmlns:a16="http://schemas.microsoft.com/office/drawing/2014/main" id="{EC4D3FF3-F514-47A1-ABCD-965276E71034}"/>
+                <a16:creationId xmlns:a16="http://schemas.microsoft.com/office/drawing/2014/main" xmlns="" id="{EC4D3FF3-F514-47A1-ABCD-965276E71034}"/>
               </a:ext>
             </a:extLst>
           </p:cNvPr>
@@ -6799,7 +6799,7 @@
           <p:cNvPr id="17" name="Footer Placeholder 3">
             <a:extLst>
               <a:ext uri="{FF2B5EF4-FFF2-40B4-BE49-F238E27FC236}">
-                <a16:creationId xmlns:a16="http://schemas.microsoft.com/office/drawing/2014/main" id="{101D5819-F210-D24B-8E64-7E567043A3B3}"/>
+                <a16:creationId xmlns:a16="http://schemas.microsoft.com/office/drawing/2014/main" xmlns="" id="{101D5819-F210-D24B-8E64-7E567043A3B3}"/>
               </a:ext>
             </a:extLst>
           </p:cNvPr>
@@ -6863,10 +6863,10 @@
       </p:sp>
       <p:pic>
         <p:nvPicPr>
-          <p:cNvPr id="19" name="Picture 18" descr="A picture containing text&#13;&#10;&#13;&#10;Description automatically generated">
-            <a:extLst>
-              <a:ext uri="{FF2B5EF4-FFF2-40B4-BE49-F238E27FC236}">
-                <a16:creationId xmlns:a16="http://schemas.microsoft.com/office/drawing/2014/main" id="{69BDF00C-CE4C-0947-AF83-EBCB2A91ACC6}"/>
+          <p:cNvPr id="19" name="Picture 18" descr="A picture containing text&#10;&#10;Description automatically generated">
+            <a:extLst>
+              <a:ext uri="{FF2B5EF4-FFF2-40B4-BE49-F238E27FC236}">
+                <a16:creationId xmlns:a16="http://schemas.microsoft.com/office/drawing/2014/main" xmlns="" id="{69BDF00C-CE4C-0947-AF83-EBCB2A91ACC6}"/>
               </a:ext>
             </a:extLst>
           </p:cNvPr>
@@ -6943,10 +6943,10 @@
           <p:cNvPr id="9" name="Rectangle 8">
             <a:extLst>
               <a:ext uri="{FF2B5EF4-FFF2-40B4-BE49-F238E27FC236}">
-                <a16:creationId xmlns:a16="http://schemas.microsoft.com/office/drawing/2014/main" id="{D8386171-E87D-46AB-8718-4CE2A88748BD}"/>
+                <a16:creationId xmlns:a16="http://schemas.microsoft.com/office/drawing/2014/main" xmlns="" id="{D8386171-E87D-46AB-8718-4CE2A88748BD}"/>
               </a:ext>
               <a:ext uri="{C183D7F6-B498-43B3-948B-1728B52AA6E4}">
-                <adec:decorative xmlns:adec="http://schemas.microsoft.com/office/drawing/2017/decorative" val="1"/>
+                <adec:decorative xmlns:adec="http://schemas.microsoft.com/office/drawing/2017/decorative" xmlns="" val="1"/>
               </a:ext>
             </a:extLst>
           </p:cNvPr>
@@ -6956,7 +6956,7 @@
           <p:nvPr>
             <p:extLst>
               <p:ext uri="{386F3935-93C4-4BCD-93E2-E3B085C9AB24}">
-                <p16:designElem xmlns:p16="http://schemas.microsoft.com/office/powerpoint/2015/main" val="1"/>
+                <p16:designElem xmlns:p16="http://schemas.microsoft.com/office/powerpoint/2015/main" xmlns="" val="1"/>
               </p:ext>
             </p:extLst>
           </p:nvPr>
@@ -7006,10 +7006,10 @@
           <p:cNvPr id="11" name="Rounded Rectangle 26">
             <a:extLst>
               <a:ext uri="{FF2B5EF4-FFF2-40B4-BE49-F238E27FC236}">
-                <a16:creationId xmlns:a16="http://schemas.microsoft.com/office/drawing/2014/main" id="{207CB456-8849-413C-8210-B663779A32E0}"/>
+                <a16:creationId xmlns:a16="http://schemas.microsoft.com/office/drawing/2014/main" xmlns="" id="{207CB456-8849-413C-8210-B663779A32E0}"/>
               </a:ext>
               <a:ext uri="{C183D7F6-B498-43B3-948B-1728B52AA6E4}">
-                <adec:decorative xmlns:adec="http://schemas.microsoft.com/office/drawing/2017/decorative" val="1"/>
+                <adec:decorative xmlns:adec="http://schemas.microsoft.com/office/drawing/2017/decorative" xmlns="" val="1"/>
               </a:ext>
             </a:extLst>
           </p:cNvPr>
@@ -7019,7 +7019,7 @@
           <p:nvPr>
             <p:extLst>
               <p:ext uri="{386F3935-93C4-4BCD-93E2-E3B085C9AB24}">
-                <p16:designElem xmlns:p16="http://schemas.microsoft.com/office/powerpoint/2015/main" val="1"/>
+                <p16:designElem xmlns:p16="http://schemas.microsoft.com/office/powerpoint/2015/main" xmlns="" val="1"/>
               </p:ext>
             </p:extLst>
           </p:nvPr>
@@ -7080,10 +7080,10 @@
           <p:cNvPr id="13" name="Rectangle 12">
             <a:extLst>
               <a:ext uri="{FF2B5EF4-FFF2-40B4-BE49-F238E27FC236}">
-                <a16:creationId xmlns:a16="http://schemas.microsoft.com/office/drawing/2014/main" id="{E513936D-D1EB-4E42-A97F-942BA1F3DFA7}"/>
+                <a16:creationId xmlns:a16="http://schemas.microsoft.com/office/drawing/2014/main" xmlns="" id="{E513936D-D1EB-4E42-A97F-942BA1F3DFA7}"/>
               </a:ext>
               <a:ext uri="{C183D7F6-B498-43B3-948B-1728B52AA6E4}">
-                <adec:decorative xmlns:adec="http://schemas.microsoft.com/office/drawing/2017/decorative" val="1"/>
+                <adec:decorative xmlns:adec="http://schemas.microsoft.com/office/drawing/2017/decorative" xmlns="" val="1"/>
               </a:ext>
             </a:extLst>
           </p:cNvPr>
@@ -7093,7 +7093,7 @@
           <p:nvPr>
             <p:extLst>
               <p:ext uri="{386F3935-93C4-4BCD-93E2-E3B085C9AB24}">
-                <p16:designElem xmlns:p16="http://schemas.microsoft.com/office/powerpoint/2015/main" val="1"/>
+                <p16:designElem xmlns:p16="http://schemas.microsoft.com/office/powerpoint/2015/main" xmlns="" val="1"/>
               </p:ext>
             </p:extLst>
           </p:nvPr>
@@ -7143,7 +7143,7 @@
           <p:cNvPr id="2" name="Title 1">
             <a:extLst>
               <a:ext uri="{FF2B5EF4-FFF2-40B4-BE49-F238E27FC236}">
-                <a16:creationId xmlns:a16="http://schemas.microsoft.com/office/drawing/2014/main" id="{3D94806F-B293-4D37-9048-408CEFB3BC68}"/>
+                <a16:creationId xmlns:a16="http://schemas.microsoft.com/office/drawing/2014/main" xmlns="" id="{3D94806F-B293-4D37-9048-408CEFB3BC68}"/>
               </a:ext>
             </a:extLst>
           </p:cNvPr>
@@ -7186,7 +7186,7 @@
           <p:cNvPr id="8" name="Footer Placeholder 3">
             <a:extLst>
               <a:ext uri="{FF2B5EF4-FFF2-40B4-BE49-F238E27FC236}">
-                <a16:creationId xmlns:a16="http://schemas.microsoft.com/office/drawing/2014/main" id="{907B2080-C7D4-C74A-A49D-E2A91908E5BB}"/>
+                <a16:creationId xmlns:a16="http://schemas.microsoft.com/office/drawing/2014/main" xmlns="" id="{907B2080-C7D4-C74A-A49D-E2A91908E5BB}"/>
               </a:ext>
             </a:extLst>
           </p:cNvPr>
@@ -7250,10 +7250,10 @@
       </p:sp>
       <p:pic>
         <p:nvPicPr>
-          <p:cNvPr id="10" name="Picture 9" descr="A picture containing text&#13;&#10;&#13;&#10;Description automatically generated">
-            <a:extLst>
-              <a:ext uri="{FF2B5EF4-FFF2-40B4-BE49-F238E27FC236}">
-                <a16:creationId xmlns:a16="http://schemas.microsoft.com/office/drawing/2014/main" id="{5AA56B12-FF1C-844C-8186-F67F249886C4}"/>
+          <p:cNvPr id="10" name="Picture 9" descr="A picture containing text&#10;&#10;Description automatically generated">
+            <a:extLst>
+              <a:ext uri="{FF2B5EF4-FFF2-40B4-BE49-F238E27FC236}">
+                <a16:creationId xmlns:a16="http://schemas.microsoft.com/office/drawing/2014/main" xmlns="" id="{5AA56B12-FF1C-844C-8186-F67F249886C4}"/>
               </a:ext>
             </a:extLst>
           </p:cNvPr>
@@ -7327,10 +7327,10 @@
           <p:cNvPr id="9" name="Rectangle 8">
             <a:extLst>
               <a:ext uri="{FF2B5EF4-FFF2-40B4-BE49-F238E27FC236}">
-                <a16:creationId xmlns:a16="http://schemas.microsoft.com/office/drawing/2014/main" id="{8D70B121-56F4-4848-B38B-182089D909FA}"/>
+                <a16:creationId xmlns:a16="http://schemas.microsoft.com/office/drawing/2014/main" xmlns="" id="{8D70B121-56F4-4848-B38B-182089D909FA}"/>
               </a:ext>
               <a:ext uri="{C183D7F6-B498-43B3-948B-1728B52AA6E4}">
-                <adec:decorative xmlns:adec="http://schemas.microsoft.com/office/drawing/2017/decorative" val="1"/>
+                <adec:decorative xmlns:adec="http://schemas.microsoft.com/office/drawing/2017/decorative" xmlns="" val="1"/>
               </a:ext>
             </a:extLst>
           </p:cNvPr>
@@ -7340,7 +7340,7 @@
           <p:nvPr>
             <p:extLst>
               <p:ext uri="{386F3935-93C4-4BCD-93E2-E3B085C9AB24}">
-                <p16:designElem xmlns:p16="http://schemas.microsoft.com/office/powerpoint/2015/main" val="1"/>
+                <p16:designElem xmlns:p16="http://schemas.microsoft.com/office/powerpoint/2015/main" xmlns="" val="1"/>
               </p:ext>
             </p:extLst>
           </p:nvPr>
@@ -7392,7 +7392,7 @@
           <p:cNvPr id="2" name="Title 1">
             <a:extLst>
               <a:ext uri="{FF2B5EF4-FFF2-40B4-BE49-F238E27FC236}">
-                <a16:creationId xmlns:a16="http://schemas.microsoft.com/office/drawing/2014/main" id="{29DF9D9A-C3D5-1346-B801-2CE72984C234}"/>
+                <a16:creationId xmlns:a16="http://schemas.microsoft.com/office/drawing/2014/main" xmlns="" id="{29DF9D9A-C3D5-1346-B801-2CE72984C234}"/>
               </a:ext>
             </a:extLst>
           </p:cNvPr>
@@ -7437,10 +7437,10 @@
           <p:cNvPr id="11" name="Straight Connector 10">
             <a:extLst>
               <a:ext uri="{FF2B5EF4-FFF2-40B4-BE49-F238E27FC236}">
-                <a16:creationId xmlns:a16="http://schemas.microsoft.com/office/drawing/2014/main" id="{2D72A2C9-F3CA-4216-8BAD-FA4C970C3C4E}"/>
+                <a16:creationId xmlns:a16="http://schemas.microsoft.com/office/drawing/2014/main" xmlns="" id="{2D72A2C9-F3CA-4216-8BAD-FA4C970C3C4E}"/>
               </a:ext>
               <a:ext uri="{C183D7F6-B498-43B3-948B-1728B52AA6E4}">
-                <adec:decorative xmlns:adec="http://schemas.microsoft.com/office/drawing/2017/decorative" val="1"/>
+                <adec:decorative xmlns:adec="http://schemas.microsoft.com/office/drawing/2017/decorative" xmlns="" val="1"/>
               </a:ext>
             </a:extLst>
           </p:cNvPr>
@@ -7450,7 +7450,7 @@
           <p:nvPr>
             <p:extLst>
               <p:ext uri="{386F3935-93C4-4BCD-93E2-E3B085C9AB24}">
-                <p16:designElem xmlns:p16="http://schemas.microsoft.com/office/powerpoint/2015/main" val="1"/>
+                <p16:designElem xmlns:p16="http://schemas.microsoft.com/office/powerpoint/2015/main" xmlns="" val="1"/>
               </p:ext>
             </p:extLst>
           </p:nvPr>
@@ -7492,7 +7492,7 @@
           <p:cNvPr id="3" name="Content Placeholder 2">
             <a:extLst>
               <a:ext uri="{FF2B5EF4-FFF2-40B4-BE49-F238E27FC236}">
-                <a16:creationId xmlns:a16="http://schemas.microsoft.com/office/drawing/2014/main" id="{1ABE68FD-372B-CD47-8C0F-8C32603C65A8}"/>
+                <a16:creationId xmlns:a16="http://schemas.microsoft.com/office/drawing/2014/main" xmlns="" id="{1ABE68FD-372B-CD47-8C0F-8C32603C65A8}"/>
               </a:ext>
             </a:extLst>
           </p:cNvPr>
@@ -7523,44 +7523,44 @@
               <a:t>In model part, the classes realize the management of all the data and logic. They load the path of images and access their features. The results of </a:t>
             </a:r>
             <a:r>
-              <a:rPr lang="en"/>
-              <a:t>classication </a:t>
+              <a:rPr lang="en" dirty="0" smtClean="0"/>
+              <a:t>classification </a:t>
             </a:r>
             <a:r>
               <a:rPr lang="en" dirty="0"/>
               <a:t>are stored in the type of string to be shown in various forms. The logic of </a:t>
             </a:r>
             <a:r>
-              <a:rPr lang="en"/>
-              <a:t>classication </a:t>
+              <a:rPr lang="en" dirty="0" smtClean="0"/>
+              <a:t>classification </a:t>
             </a:r>
             <a:r>
               <a:rPr lang="en" dirty="0"/>
               <a:t>is determined by the neural network being used. Its topology </a:t>
             </a:r>
             <a:r>
-              <a:rPr lang="en"/>
-              <a:t>denes </a:t>
+              <a:rPr lang="en" dirty="0" smtClean="0"/>
+              <a:t>defines </a:t>
             </a:r>
             <a:r>
               <a:rPr lang="en" dirty="0"/>
               <a:t>how </a:t>
             </a:r>
             <a:r>
-              <a:rPr lang="en"/>
-              <a:t>dierent </a:t>
+              <a:rPr lang="en" dirty="0" smtClean="0"/>
+              <a:t>diferent </a:t>
             </a:r>
             <a:r>
               <a:rPr lang="en" dirty="0"/>
               <a:t>layers interact with each other. With the assistance of all the layers, the forward propagation functionality can be implemented, which is the core of algorithms for image </a:t>
             </a:r>
             <a:r>
-              <a:rPr lang="en"/>
-              <a:t>classication</a:t>
+              <a:rPr lang="en" dirty="0" smtClean="0"/>
+              <a:t>classification </a:t>
             </a:r>
             <a:r>
               <a:rPr lang="en" dirty="0"/>
-              <a:t> with pre-trained model.</a:t>
+              <a:t>with pre-trained model.</a:t>
             </a:r>
             <a:endParaRPr lang="de-DE" dirty="0"/>
           </a:p>
@@ -7571,7 +7571,7 @@
           <p:cNvPr id="7" name="Footer Placeholder 3">
             <a:extLst>
               <a:ext uri="{FF2B5EF4-FFF2-40B4-BE49-F238E27FC236}">
-                <a16:creationId xmlns:a16="http://schemas.microsoft.com/office/drawing/2014/main" id="{2675B178-7879-5B4D-A586-36B5BF32A1FB}"/>
+                <a16:creationId xmlns:a16="http://schemas.microsoft.com/office/drawing/2014/main" xmlns="" id="{2675B178-7879-5B4D-A586-36B5BF32A1FB}"/>
               </a:ext>
             </a:extLst>
           </p:cNvPr>
@@ -7719,10 +7719,10 @@
       </p:sp>
       <p:pic>
         <p:nvPicPr>
-          <p:cNvPr id="8" name="Picture 7" descr="A picture containing text&#13;&#10;&#13;&#10;Description automatically generated">
-            <a:extLst>
-              <a:ext uri="{FF2B5EF4-FFF2-40B4-BE49-F238E27FC236}">
-                <a16:creationId xmlns:a16="http://schemas.microsoft.com/office/drawing/2014/main" id="{EE3D2F4E-20E6-E042-86A9-9C558CFFD0AF}"/>
+          <p:cNvPr id="8" name="Picture 7" descr="A picture containing text&#10;&#10;Description automatically generated">
+            <a:extLst>
+              <a:ext uri="{FF2B5EF4-FFF2-40B4-BE49-F238E27FC236}">
+                <a16:creationId xmlns:a16="http://schemas.microsoft.com/office/drawing/2014/main" xmlns="" id="{EE3D2F4E-20E6-E042-86A9-9C558CFFD0AF}"/>
               </a:ext>
             </a:extLst>
           </p:cNvPr>
@@ -7799,10 +7799,10 @@
           <p:cNvPr id="9" name="Rectangle 8">
             <a:extLst>
               <a:ext uri="{FF2B5EF4-FFF2-40B4-BE49-F238E27FC236}">
-                <a16:creationId xmlns:a16="http://schemas.microsoft.com/office/drawing/2014/main" id="{8D70B121-56F4-4848-B38B-182089D909FA}"/>
+                <a16:creationId xmlns:a16="http://schemas.microsoft.com/office/drawing/2014/main" xmlns="" id="{8D70B121-56F4-4848-B38B-182089D909FA}"/>
               </a:ext>
               <a:ext uri="{C183D7F6-B498-43B3-948B-1728B52AA6E4}">
-                <adec:decorative xmlns:adec="http://schemas.microsoft.com/office/drawing/2017/decorative" val="1"/>
+                <adec:decorative xmlns:adec="http://schemas.microsoft.com/office/drawing/2017/decorative" xmlns="" val="1"/>
               </a:ext>
             </a:extLst>
           </p:cNvPr>
@@ -7812,7 +7812,7 @@
           <p:nvPr>
             <p:extLst>
               <p:ext uri="{386F3935-93C4-4BCD-93E2-E3B085C9AB24}">
-                <p16:designElem xmlns:p16="http://schemas.microsoft.com/office/powerpoint/2015/main" val="1"/>
+                <p16:designElem xmlns:p16="http://schemas.microsoft.com/office/powerpoint/2015/main" xmlns="" val="1"/>
               </p:ext>
             </p:extLst>
           </p:nvPr>
@@ -7864,7 +7864,7 @@
           <p:cNvPr id="2" name="Title 1">
             <a:extLst>
               <a:ext uri="{FF2B5EF4-FFF2-40B4-BE49-F238E27FC236}">
-                <a16:creationId xmlns:a16="http://schemas.microsoft.com/office/drawing/2014/main" id="{40E76B22-D442-B448-935C-6C6D61B7BB7C}"/>
+                <a16:creationId xmlns:a16="http://schemas.microsoft.com/office/drawing/2014/main" xmlns="" id="{40E76B22-D442-B448-935C-6C6D61B7BB7C}"/>
               </a:ext>
             </a:extLst>
           </p:cNvPr>
@@ -7909,10 +7909,10 @@
           <p:cNvPr id="11" name="Straight Connector 10">
             <a:extLst>
               <a:ext uri="{FF2B5EF4-FFF2-40B4-BE49-F238E27FC236}">
-                <a16:creationId xmlns:a16="http://schemas.microsoft.com/office/drawing/2014/main" id="{2D72A2C9-F3CA-4216-8BAD-FA4C970C3C4E}"/>
+                <a16:creationId xmlns:a16="http://schemas.microsoft.com/office/drawing/2014/main" xmlns="" id="{2D72A2C9-F3CA-4216-8BAD-FA4C970C3C4E}"/>
               </a:ext>
               <a:ext uri="{C183D7F6-B498-43B3-948B-1728B52AA6E4}">
-                <adec:decorative xmlns:adec="http://schemas.microsoft.com/office/drawing/2017/decorative" val="1"/>
+                <adec:decorative xmlns:adec="http://schemas.microsoft.com/office/drawing/2017/decorative" xmlns="" val="1"/>
               </a:ext>
             </a:extLst>
           </p:cNvPr>
@@ -7922,7 +7922,7 @@
           <p:nvPr>
             <p:extLst>
               <p:ext uri="{386F3935-93C4-4BCD-93E2-E3B085C9AB24}">
-                <p16:designElem xmlns:p16="http://schemas.microsoft.com/office/powerpoint/2015/main" val="1"/>
+                <p16:designElem xmlns:p16="http://schemas.microsoft.com/office/powerpoint/2015/main" xmlns="" val="1"/>
               </p:ext>
             </p:extLst>
           </p:nvPr>
@@ -7964,7 +7964,7 @@
           <p:cNvPr id="3" name="Content Placeholder 2">
             <a:extLst>
               <a:ext uri="{FF2B5EF4-FFF2-40B4-BE49-F238E27FC236}">
-                <a16:creationId xmlns:a16="http://schemas.microsoft.com/office/drawing/2014/main" id="{4062CDC7-1995-6A40-9CEB-6307208FA7FA}"/>
+                <a16:creationId xmlns:a16="http://schemas.microsoft.com/office/drawing/2014/main" xmlns="" id="{4062CDC7-1995-6A40-9CEB-6307208FA7FA}"/>
               </a:ext>
             </a:extLst>
           </p:cNvPr>
@@ -7992,12 +7992,24 @@
               <a:t>realizes the user interfaces. The welcome window and the main window, which contains three </a:t>
             </a:r>
             <a:r>
-              <a:rPr lang="en"/>
-              <a:t>dierent </a:t>
+              <a:rPr lang="en" dirty="0" smtClean="0"/>
+              <a:t>different </a:t>
             </a:r>
             <a:r>
               <a:rPr lang="en" dirty="0"/>
-              <a:t>sections, guide the user to upload their input les, select available platforms and operating mode, let them control the process and show the prediction results.</a:t>
+              <a:t>sections, guide the user to upload their input </a:t>
+            </a:r>
+            <a:r>
+              <a:rPr lang="en" dirty="0" smtClean="0"/>
+              <a:t>images</a:t>
+            </a:r>
+            <a:r>
+              <a:rPr lang="en" dirty="0" smtClean="0"/>
+              <a:t>, </a:t>
+            </a:r>
+            <a:r>
+              <a:rPr lang="en" dirty="0"/>
+              <a:t>select available platforms and operating mode, let them control the process and show the prediction results.</a:t>
             </a:r>
             <a:endParaRPr lang="de-DE" dirty="0"/>
           </a:p>
@@ -8008,7 +8020,7 @@
           <p:cNvPr id="7" name="Footer Placeholder 3">
             <a:extLst>
               <a:ext uri="{FF2B5EF4-FFF2-40B4-BE49-F238E27FC236}">
-                <a16:creationId xmlns:a16="http://schemas.microsoft.com/office/drawing/2014/main" id="{0AC38E0C-5F75-B64F-8317-AB36529A58A5}"/>
+                <a16:creationId xmlns:a16="http://schemas.microsoft.com/office/drawing/2014/main" xmlns="" id="{0AC38E0C-5F75-B64F-8317-AB36529A58A5}"/>
               </a:ext>
             </a:extLst>
           </p:cNvPr>
@@ -8156,10 +8168,10 @@
       </p:sp>
       <p:pic>
         <p:nvPicPr>
-          <p:cNvPr id="8" name="Picture 7" descr="A picture containing text&#13;&#10;&#13;&#10;Description automatically generated">
-            <a:extLst>
-              <a:ext uri="{FF2B5EF4-FFF2-40B4-BE49-F238E27FC236}">
-                <a16:creationId xmlns:a16="http://schemas.microsoft.com/office/drawing/2014/main" id="{61E34759-C4DF-DA44-B5C3-A5B2EBD1DE29}"/>
+          <p:cNvPr id="8" name="Picture 7" descr="A picture containing text&#10;&#10;Description automatically generated">
+            <a:extLst>
+              <a:ext uri="{FF2B5EF4-FFF2-40B4-BE49-F238E27FC236}">
+                <a16:creationId xmlns:a16="http://schemas.microsoft.com/office/drawing/2014/main" xmlns="" id="{61E34759-C4DF-DA44-B5C3-A5B2EBD1DE29}"/>
               </a:ext>
             </a:extLst>
           </p:cNvPr>
@@ -8236,10 +8248,10 @@
           <p:cNvPr id="9" name="Rectangle 8">
             <a:extLst>
               <a:ext uri="{FF2B5EF4-FFF2-40B4-BE49-F238E27FC236}">
-                <a16:creationId xmlns:a16="http://schemas.microsoft.com/office/drawing/2014/main" id="{8D70B121-56F4-4848-B38B-182089D909FA}"/>
+                <a16:creationId xmlns:a16="http://schemas.microsoft.com/office/drawing/2014/main" xmlns="" id="{8D70B121-56F4-4848-B38B-182089D909FA}"/>
               </a:ext>
               <a:ext uri="{C183D7F6-B498-43B3-948B-1728B52AA6E4}">
-                <adec:decorative xmlns:adec="http://schemas.microsoft.com/office/drawing/2017/decorative" val="1"/>
+                <adec:decorative xmlns:adec="http://schemas.microsoft.com/office/drawing/2017/decorative" xmlns="" val="1"/>
               </a:ext>
             </a:extLst>
           </p:cNvPr>
@@ -8249,7 +8261,7 @@
           <p:nvPr>
             <p:extLst>
               <p:ext uri="{386F3935-93C4-4BCD-93E2-E3B085C9AB24}">
-                <p16:designElem xmlns:p16="http://schemas.microsoft.com/office/powerpoint/2015/main" val="1"/>
+                <p16:designElem xmlns:p16="http://schemas.microsoft.com/office/powerpoint/2015/main" xmlns="" val="1"/>
               </p:ext>
             </p:extLst>
           </p:nvPr>
@@ -8301,7 +8313,7 @@
           <p:cNvPr id="2" name="Title 1">
             <a:extLst>
               <a:ext uri="{FF2B5EF4-FFF2-40B4-BE49-F238E27FC236}">
-                <a16:creationId xmlns:a16="http://schemas.microsoft.com/office/drawing/2014/main" id="{92B08795-5276-4F48-A0CC-98363243A9B8}"/>
+                <a16:creationId xmlns:a16="http://schemas.microsoft.com/office/drawing/2014/main" xmlns="" id="{92B08795-5276-4F48-A0CC-98363243A9B8}"/>
               </a:ext>
             </a:extLst>
           </p:cNvPr>
@@ -8346,10 +8358,10 @@
           <p:cNvPr id="11" name="Straight Connector 10">
             <a:extLst>
               <a:ext uri="{FF2B5EF4-FFF2-40B4-BE49-F238E27FC236}">
-                <a16:creationId xmlns:a16="http://schemas.microsoft.com/office/drawing/2014/main" id="{2D72A2C9-F3CA-4216-8BAD-FA4C970C3C4E}"/>
+                <a16:creationId xmlns:a16="http://schemas.microsoft.com/office/drawing/2014/main" xmlns="" id="{2D72A2C9-F3CA-4216-8BAD-FA4C970C3C4E}"/>
               </a:ext>
               <a:ext uri="{C183D7F6-B498-43B3-948B-1728B52AA6E4}">
-                <adec:decorative xmlns:adec="http://schemas.microsoft.com/office/drawing/2017/decorative" val="1"/>
+                <adec:decorative xmlns:adec="http://schemas.microsoft.com/office/drawing/2017/decorative" xmlns="" val="1"/>
               </a:ext>
             </a:extLst>
           </p:cNvPr>
@@ -8359,7 +8371,7 @@
           <p:nvPr>
             <p:extLst>
               <p:ext uri="{386F3935-93C4-4BCD-93E2-E3B085C9AB24}">
-                <p16:designElem xmlns:p16="http://schemas.microsoft.com/office/powerpoint/2015/main" val="1"/>
+                <p16:designElem xmlns:p16="http://schemas.microsoft.com/office/powerpoint/2015/main" xmlns="" val="1"/>
               </p:ext>
             </p:extLst>
           </p:nvPr>
@@ -8401,7 +8413,7 @@
           <p:cNvPr id="3" name="Content Placeholder 2">
             <a:extLst>
               <a:ext uri="{FF2B5EF4-FFF2-40B4-BE49-F238E27FC236}">
-                <a16:creationId xmlns:a16="http://schemas.microsoft.com/office/drawing/2014/main" id="{1431E985-53B9-0547-B5AE-EA3D4A043690}"/>
+                <a16:creationId xmlns:a16="http://schemas.microsoft.com/office/drawing/2014/main" xmlns="" id="{1431E985-53B9-0547-B5AE-EA3D4A043690}"/>
               </a:ext>
             </a:extLst>
           </p:cNvPr>
@@ -8429,32 +8441,24 @@
               <a:t>accepts user inputs handled by the components of the views and converts them to the commands. The </a:t>
             </a:r>
             <a:r>
-              <a:rPr lang="en"/>
-              <a:t>classier </a:t>
+              <a:rPr lang="en" dirty="0" smtClean="0"/>
+              <a:t>classifier </a:t>
             </a:r>
             <a:r>
               <a:rPr lang="en" dirty="0"/>
-              <a:t>controls the progress of processing and assigns the scheduler to dispatch work to workers in heterogeneous platforms. In addition, the </a:t>
-            </a:r>
-            <a:r>
-              <a:rPr lang="en"/>
-              <a:t>poller</a:t>
-            </a:r>
-            <a:r>
-              <a:rPr lang="en" dirty="0"/>
-              <a:t> checks the requests from external systems regularly. After receiving the correct request with the image path, the </a:t>
-            </a:r>
-            <a:r>
-              <a:rPr lang="en"/>
-              <a:t>classier </a:t>
+              <a:t>controls the progress of processing and assigns the scheduler to dispatch work to workers in heterogeneous platforms. In addition, the poller checks the requests from external systems regularly. After receiving the correct request with the image path, the </a:t>
+            </a:r>
+            <a:r>
+              <a:rPr lang="en" dirty="0" smtClean="0"/>
+              <a:t>classifier </a:t>
             </a:r>
             <a:r>
               <a:rPr lang="en" dirty="0"/>
               <a:t>starts the process of </a:t>
             </a:r>
             <a:r>
-              <a:rPr lang="en"/>
-              <a:t>classication</a:t>
+              <a:rPr lang="en" dirty="0" smtClean="0"/>
+              <a:t>classification</a:t>
             </a:r>
             <a:r>
               <a:rPr lang="en" dirty="0"/>
@@ -8469,7 +8473,7 @@
           <p:cNvPr id="7" name="Footer Placeholder 3">
             <a:extLst>
               <a:ext uri="{FF2B5EF4-FFF2-40B4-BE49-F238E27FC236}">
-                <a16:creationId xmlns:a16="http://schemas.microsoft.com/office/drawing/2014/main" id="{E2AE959F-D611-754B-AA92-E24D107ABAA3}"/>
+                <a16:creationId xmlns:a16="http://schemas.microsoft.com/office/drawing/2014/main" xmlns="" id="{E2AE959F-D611-754B-AA92-E24D107ABAA3}"/>
               </a:ext>
             </a:extLst>
           </p:cNvPr>
@@ -8617,10 +8621,10 @@
       </p:sp>
       <p:pic>
         <p:nvPicPr>
-          <p:cNvPr id="8" name="Picture 7" descr="A picture containing text&#13;&#10;&#13;&#10;Description automatically generated">
-            <a:extLst>
-              <a:ext uri="{FF2B5EF4-FFF2-40B4-BE49-F238E27FC236}">
-                <a16:creationId xmlns:a16="http://schemas.microsoft.com/office/drawing/2014/main" id="{8C0DE109-CA2B-B248-B06D-00D1C92C3E66}"/>
+          <p:cNvPr id="8" name="Picture 7" descr="A picture containing text&#10;&#10;Description automatically generated">
+            <a:extLst>
+              <a:ext uri="{FF2B5EF4-FFF2-40B4-BE49-F238E27FC236}">
+                <a16:creationId xmlns:a16="http://schemas.microsoft.com/office/drawing/2014/main" xmlns="" id="{8C0DE109-CA2B-B248-B06D-00D1C92C3E66}"/>
               </a:ext>
             </a:extLst>
           </p:cNvPr>
@@ -8697,10 +8701,10 @@
           <p:cNvPr id="9" name="Rectangle 8">
             <a:extLst>
               <a:ext uri="{FF2B5EF4-FFF2-40B4-BE49-F238E27FC236}">
-                <a16:creationId xmlns:a16="http://schemas.microsoft.com/office/drawing/2014/main" id="{D8386171-E87D-46AB-8718-4CE2A88748BD}"/>
+                <a16:creationId xmlns:a16="http://schemas.microsoft.com/office/drawing/2014/main" xmlns="" id="{D8386171-E87D-46AB-8718-4CE2A88748BD}"/>
               </a:ext>
               <a:ext uri="{C183D7F6-B498-43B3-948B-1728B52AA6E4}">
-                <adec:decorative xmlns:adec="http://schemas.microsoft.com/office/drawing/2017/decorative" val="1"/>
+                <adec:decorative xmlns:adec="http://schemas.microsoft.com/office/drawing/2017/decorative" xmlns="" val="1"/>
               </a:ext>
             </a:extLst>
           </p:cNvPr>
@@ -8710,7 +8714,7 @@
           <p:nvPr>
             <p:extLst>
               <p:ext uri="{386F3935-93C4-4BCD-93E2-E3B085C9AB24}">
-                <p16:designElem xmlns:p16="http://schemas.microsoft.com/office/powerpoint/2015/main" val="1"/>
+                <p16:designElem xmlns:p16="http://schemas.microsoft.com/office/powerpoint/2015/main" xmlns="" val="1"/>
               </p:ext>
             </p:extLst>
           </p:nvPr>
@@ -8760,10 +8764,10 @@
           <p:cNvPr id="11" name="Rounded Rectangle 26">
             <a:extLst>
               <a:ext uri="{FF2B5EF4-FFF2-40B4-BE49-F238E27FC236}">
-                <a16:creationId xmlns:a16="http://schemas.microsoft.com/office/drawing/2014/main" id="{207CB456-8849-413C-8210-B663779A32E0}"/>
+                <a16:creationId xmlns:a16="http://schemas.microsoft.com/office/drawing/2014/main" xmlns="" id="{207CB456-8849-413C-8210-B663779A32E0}"/>
               </a:ext>
               <a:ext uri="{C183D7F6-B498-43B3-948B-1728B52AA6E4}">
-                <adec:decorative xmlns:adec="http://schemas.microsoft.com/office/drawing/2017/decorative" val="1"/>
+                <adec:decorative xmlns:adec="http://schemas.microsoft.com/office/drawing/2017/decorative" xmlns="" val="1"/>
               </a:ext>
             </a:extLst>
           </p:cNvPr>
@@ -8773,7 +8777,7 @@
           <p:nvPr>
             <p:extLst>
               <p:ext uri="{386F3935-93C4-4BCD-93E2-E3B085C9AB24}">
-                <p16:designElem xmlns:p16="http://schemas.microsoft.com/office/powerpoint/2015/main" val="1"/>
+                <p16:designElem xmlns:p16="http://schemas.microsoft.com/office/powerpoint/2015/main" xmlns="" val="1"/>
               </p:ext>
             </p:extLst>
           </p:nvPr>
@@ -8834,10 +8838,10 @@
           <p:cNvPr id="13" name="Rectangle 12">
             <a:extLst>
               <a:ext uri="{FF2B5EF4-FFF2-40B4-BE49-F238E27FC236}">
-                <a16:creationId xmlns:a16="http://schemas.microsoft.com/office/drawing/2014/main" id="{E513936D-D1EB-4E42-A97F-942BA1F3DFA7}"/>
+                <a16:creationId xmlns:a16="http://schemas.microsoft.com/office/drawing/2014/main" xmlns="" id="{E513936D-D1EB-4E42-A97F-942BA1F3DFA7}"/>
               </a:ext>
               <a:ext uri="{C183D7F6-B498-43B3-948B-1728B52AA6E4}">
-                <adec:decorative xmlns:adec="http://schemas.microsoft.com/office/drawing/2017/decorative" val="1"/>
+                <adec:decorative xmlns:adec="http://schemas.microsoft.com/office/drawing/2017/decorative" xmlns="" val="1"/>
               </a:ext>
             </a:extLst>
           </p:cNvPr>
@@ -8847,7 +8851,7 @@
           <p:nvPr>
             <p:extLst>
               <p:ext uri="{386F3935-93C4-4BCD-93E2-E3B085C9AB24}">
-                <p16:designElem xmlns:p16="http://schemas.microsoft.com/office/powerpoint/2015/main" val="1"/>
+                <p16:designElem xmlns:p16="http://schemas.microsoft.com/office/powerpoint/2015/main" xmlns="" val="1"/>
               </p:ext>
             </p:extLst>
           </p:nvPr>
@@ -8897,7 +8901,7 @@
           <p:cNvPr id="2" name="Title 1">
             <a:extLst>
               <a:ext uri="{FF2B5EF4-FFF2-40B4-BE49-F238E27FC236}">
-                <a16:creationId xmlns:a16="http://schemas.microsoft.com/office/drawing/2014/main" id="{1CECF447-19CC-4DAC-A604-C9F7EFD610BD}"/>
+                <a16:creationId xmlns:a16="http://schemas.microsoft.com/office/drawing/2014/main" xmlns="" id="{1CECF447-19CC-4DAC-A604-C9F7EFD610BD}"/>
               </a:ext>
             </a:extLst>
           </p:cNvPr>
@@ -8940,7 +8944,7 @@
           <p:cNvPr id="12" name="Footer Placeholder 3">
             <a:extLst>
               <a:ext uri="{FF2B5EF4-FFF2-40B4-BE49-F238E27FC236}">
-                <a16:creationId xmlns:a16="http://schemas.microsoft.com/office/drawing/2014/main" id="{89AE93F1-92B6-F147-9A3B-92D24CBAD928}"/>
+                <a16:creationId xmlns:a16="http://schemas.microsoft.com/office/drawing/2014/main" xmlns="" id="{89AE93F1-92B6-F147-9A3B-92D24CBAD928}"/>
               </a:ext>
             </a:extLst>
           </p:cNvPr>
@@ -9004,10 +9008,10 @@
       </p:sp>
       <p:pic>
         <p:nvPicPr>
-          <p:cNvPr id="14" name="Picture 13" descr="A picture containing text&#13;&#10;&#13;&#10;Description automatically generated">
-            <a:extLst>
-              <a:ext uri="{FF2B5EF4-FFF2-40B4-BE49-F238E27FC236}">
-                <a16:creationId xmlns:a16="http://schemas.microsoft.com/office/drawing/2014/main" id="{5B9CD1A6-EE42-764C-8105-5409E2D96CDB}"/>
+          <p:cNvPr id="14" name="Picture 13" descr="A picture containing text&#10;&#10;Description automatically generated">
+            <a:extLst>
+              <a:ext uri="{FF2B5EF4-FFF2-40B4-BE49-F238E27FC236}">
+                <a16:creationId xmlns:a16="http://schemas.microsoft.com/office/drawing/2014/main" xmlns="" id="{5B9CD1A6-EE42-764C-8105-5409E2D96CDB}"/>
               </a:ext>
             </a:extLst>
           </p:cNvPr>
@@ -9081,7 +9085,7 @@
           <p:cNvPr id="10" name="Picture 9">
             <a:extLst>
               <a:ext uri="{FF2B5EF4-FFF2-40B4-BE49-F238E27FC236}">
-                <a16:creationId xmlns:a16="http://schemas.microsoft.com/office/drawing/2014/main" id="{7ACE3320-7B85-4A44-AD5F-8114C783393B}"/>
+                <a16:creationId xmlns:a16="http://schemas.microsoft.com/office/drawing/2014/main" xmlns="" id="{7ACE3320-7B85-4A44-AD5F-8114C783393B}"/>
               </a:ext>
             </a:extLst>
           </p:cNvPr>
@@ -9117,7 +9121,7 @@
           <p:cNvPr id="20" name="Footer Placeholder 3">
             <a:extLst>
               <a:ext uri="{FF2B5EF4-FFF2-40B4-BE49-F238E27FC236}">
-                <a16:creationId xmlns:a16="http://schemas.microsoft.com/office/drawing/2014/main" id="{4DFB8117-4A43-A940-BD3A-71F92ADD5C4F}"/>
+                <a16:creationId xmlns:a16="http://schemas.microsoft.com/office/drawing/2014/main" xmlns="" id="{4DFB8117-4A43-A940-BD3A-71F92ADD5C4F}"/>
               </a:ext>
             </a:extLst>
           </p:cNvPr>
@@ -9309,10 +9313,10 @@
           <p:cNvPr id="9" name="Rectangle 8">
             <a:extLst>
               <a:ext uri="{FF2B5EF4-FFF2-40B4-BE49-F238E27FC236}">
-                <a16:creationId xmlns:a16="http://schemas.microsoft.com/office/drawing/2014/main" id="{D8386171-E87D-46AB-8718-4CE2A88748BD}"/>
+                <a16:creationId xmlns:a16="http://schemas.microsoft.com/office/drawing/2014/main" xmlns="" id="{D8386171-E87D-46AB-8718-4CE2A88748BD}"/>
               </a:ext>
               <a:ext uri="{C183D7F6-B498-43B3-948B-1728B52AA6E4}">
-                <adec:decorative xmlns:adec="http://schemas.microsoft.com/office/drawing/2017/decorative" val="1"/>
+                <adec:decorative xmlns:adec="http://schemas.microsoft.com/office/drawing/2017/decorative" xmlns="" val="1"/>
               </a:ext>
             </a:extLst>
           </p:cNvPr>
@@ -9322,7 +9326,7 @@
           <p:nvPr>
             <p:extLst>
               <p:ext uri="{386F3935-93C4-4BCD-93E2-E3B085C9AB24}">
-                <p16:designElem xmlns:p16="http://schemas.microsoft.com/office/powerpoint/2015/main" val="1"/>
+                <p16:designElem xmlns:p16="http://schemas.microsoft.com/office/powerpoint/2015/main" xmlns="" val="1"/>
               </p:ext>
             </p:extLst>
           </p:nvPr>
@@ -9372,10 +9376,10 @@
           <p:cNvPr id="11" name="Rounded Rectangle 26">
             <a:extLst>
               <a:ext uri="{FF2B5EF4-FFF2-40B4-BE49-F238E27FC236}">
-                <a16:creationId xmlns:a16="http://schemas.microsoft.com/office/drawing/2014/main" id="{207CB456-8849-413C-8210-B663779A32E0}"/>
+                <a16:creationId xmlns:a16="http://schemas.microsoft.com/office/drawing/2014/main" xmlns="" id="{207CB456-8849-413C-8210-B663779A32E0}"/>
               </a:ext>
               <a:ext uri="{C183D7F6-B498-43B3-948B-1728B52AA6E4}">
-                <adec:decorative xmlns:adec="http://schemas.microsoft.com/office/drawing/2017/decorative" val="1"/>
+                <adec:decorative xmlns:adec="http://schemas.microsoft.com/office/drawing/2017/decorative" xmlns="" val="1"/>
               </a:ext>
             </a:extLst>
           </p:cNvPr>
@@ -9385,7 +9389,7 @@
           <p:nvPr>
             <p:extLst>
               <p:ext uri="{386F3935-93C4-4BCD-93E2-E3B085C9AB24}">
-                <p16:designElem xmlns:p16="http://schemas.microsoft.com/office/powerpoint/2015/main" val="1"/>
+                <p16:designElem xmlns:p16="http://schemas.microsoft.com/office/powerpoint/2015/main" xmlns="" val="1"/>
               </p:ext>
             </p:extLst>
           </p:nvPr>
@@ -9446,10 +9450,10 @@
           <p:cNvPr id="13" name="Rectangle 12">
             <a:extLst>
               <a:ext uri="{FF2B5EF4-FFF2-40B4-BE49-F238E27FC236}">
-                <a16:creationId xmlns:a16="http://schemas.microsoft.com/office/drawing/2014/main" id="{E513936D-D1EB-4E42-A97F-942BA1F3DFA7}"/>
+                <a16:creationId xmlns:a16="http://schemas.microsoft.com/office/drawing/2014/main" xmlns="" id="{E513936D-D1EB-4E42-A97F-942BA1F3DFA7}"/>
               </a:ext>
               <a:ext uri="{C183D7F6-B498-43B3-948B-1728B52AA6E4}">
-                <adec:decorative xmlns:adec="http://schemas.microsoft.com/office/drawing/2017/decorative" val="1"/>
+                <adec:decorative xmlns:adec="http://schemas.microsoft.com/office/drawing/2017/decorative" xmlns="" val="1"/>
               </a:ext>
             </a:extLst>
           </p:cNvPr>
@@ -9459,7 +9463,7 @@
           <p:nvPr>
             <p:extLst>
               <p:ext uri="{386F3935-93C4-4BCD-93E2-E3B085C9AB24}">
-                <p16:designElem xmlns:p16="http://schemas.microsoft.com/office/powerpoint/2015/main" val="1"/>
+                <p16:designElem xmlns:p16="http://schemas.microsoft.com/office/powerpoint/2015/main" xmlns="" val="1"/>
               </p:ext>
             </p:extLst>
           </p:nvPr>
@@ -9509,7 +9513,7 @@
           <p:cNvPr id="2" name="Title 1">
             <a:extLst>
               <a:ext uri="{FF2B5EF4-FFF2-40B4-BE49-F238E27FC236}">
-                <a16:creationId xmlns:a16="http://schemas.microsoft.com/office/drawing/2014/main" id="{7A683847-B48E-4BFD-82DC-DCF393AEBEAF}"/>
+                <a16:creationId xmlns:a16="http://schemas.microsoft.com/office/drawing/2014/main" xmlns="" id="{7A683847-B48E-4BFD-82DC-DCF393AEBEAF}"/>
               </a:ext>
             </a:extLst>
           </p:cNvPr>
@@ -9552,7 +9556,7 @@
           <p:cNvPr id="19" name="Footer Placeholder 3">
             <a:extLst>
               <a:ext uri="{FF2B5EF4-FFF2-40B4-BE49-F238E27FC236}">
-                <a16:creationId xmlns:a16="http://schemas.microsoft.com/office/drawing/2014/main" id="{1835E9B0-395B-7B4C-9F00-607AB3ABA5A4}"/>
+                <a16:creationId xmlns:a16="http://schemas.microsoft.com/office/drawing/2014/main" xmlns="" id="{1835E9B0-395B-7B4C-9F00-607AB3ABA5A4}"/>
               </a:ext>
             </a:extLst>
           </p:cNvPr>
@@ -9616,10 +9620,10 @@
       </p:sp>
       <p:pic>
         <p:nvPicPr>
-          <p:cNvPr id="23" name="Picture 22" descr="A picture containing text&#13;&#10;&#13;&#10;Description automatically generated">
-            <a:extLst>
-              <a:ext uri="{FF2B5EF4-FFF2-40B4-BE49-F238E27FC236}">
-                <a16:creationId xmlns:a16="http://schemas.microsoft.com/office/drawing/2014/main" id="{314A7487-6E48-BB4B-91A7-88223ED17D49}"/>
+          <p:cNvPr id="23" name="Picture 22" descr="A picture containing text&#10;&#10;Description automatically generated">
+            <a:extLst>
+              <a:ext uri="{FF2B5EF4-FFF2-40B4-BE49-F238E27FC236}">
+                <a16:creationId xmlns:a16="http://schemas.microsoft.com/office/drawing/2014/main" xmlns="" id="{314A7487-6E48-BB4B-91A7-88223ED17D49}"/>
               </a:ext>
             </a:extLst>
           </p:cNvPr>
@@ -9693,10 +9697,10 @@
           <p:cNvPr id="9" name="Rectangle 8">
             <a:extLst>
               <a:ext uri="{FF2B5EF4-FFF2-40B4-BE49-F238E27FC236}">
-                <a16:creationId xmlns:a16="http://schemas.microsoft.com/office/drawing/2014/main" id="{D8386171-E87D-46AB-8718-4CE2A88748BD}"/>
+                <a16:creationId xmlns:a16="http://schemas.microsoft.com/office/drawing/2014/main" xmlns="" id="{D8386171-E87D-46AB-8718-4CE2A88748BD}"/>
               </a:ext>
               <a:ext uri="{C183D7F6-B498-43B3-948B-1728B52AA6E4}">
-                <adec:decorative xmlns:adec="http://schemas.microsoft.com/office/drawing/2017/decorative" val="1"/>
+                <adec:decorative xmlns:adec="http://schemas.microsoft.com/office/drawing/2017/decorative" xmlns="" val="1"/>
               </a:ext>
             </a:extLst>
           </p:cNvPr>
@@ -9706,7 +9710,7 @@
           <p:nvPr>
             <p:extLst>
               <p:ext uri="{386F3935-93C4-4BCD-93E2-E3B085C9AB24}">
-                <p16:designElem xmlns:p16="http://schemas.microsoft.com/office/powerpoint/2015/main" val="1"/>
+                <p16:designElem xmlns:p16="http://schemas.microsoft.com/office/powerpoint/2015/main" xmlns="" val="1"/>
               </p:ext>
             </p:extLst>
           </p:nvPr>
@@ -9756,10 +9760,10 @@
           <p:cNvPr id="11" name="Rounded Rectangle 26">
             <a:extLst>
               <a:ext uri="{FF2B5EF4-FFF2-40B4-BE49-F238E27FC236}">
-                <a16:creationId xmlns:a16="http://schemas.microsoft.com/office/drawing/2014/main" id="{207CB456-8849-413C-8210-B663779A32E0}"/>
+                <a16:creationId xmlns:a16="http://schemas.microsoft.com/office/drawing/2014/main" xmlns="" id="{207CB456-8849-413C-8210-B663779A32E0}"/>
               </a:ext>
               <a:ext uri="{C183D7F6-B498-43B3-948B-1728B52AA6E4}">
-                <adec:decorative xmlns:adec="http://schemas.microsoft.com/office/drawing/2017/decorative" val="1"/>
+                <adec:decorative xmlns:adec="http://schemas.microsoft.com/office/drawing/2017/decorative" xmlns="" val="1"/>
               </a:ext>
             </a:extLst>
           </p:cNvPr>
@@ -9769,7 +9773,7 @@
           <p:nvPr>
             <p:extLst>
               <p:ext uri="{386F3935-93C4-4BCD-93E2-E3B085C9AB24}">
-                <p16:designElem xmlns:p16="http://schemas.microsoft.com/office/powerpoint/2015/main" val="1"/>
+                <p16:designElem xmlns:p16="http://schemas.microsoft.com/office/powerpoint/2015/main" xmlns="" val="1"/>
               </p:ext>
             </p:extLst>
           </p:nvPr>
@@ -9830,10 +9834,10 @@
           <p:cNvPr id="13" name="Rectangle 12">
             <a:extLst>
               <a:ext uri="{FF2B5EF4-FFF2-40B4-BE49-F238E27FC236}">
-                <a16:creationId xmlns:a16="http://schemas.microsoft.com/office/drawing/2014/main" id="{E513936D-D1EB-4E42-A97F-942BA1F3DFA7}"/>
+                <a16:creationId xmlns:a16="http://schemas.microsoft.com/office/drawing/2014/main" xmlns="" id="{E513936D-D1EB-4E42-A97F-942BA1F3DFA7}"/>
               </a:ext>
               <a:ext uri="{C183D7F6-B498-43B3-948B-1728B52AA6E4}">
-                <adec:decorative xmlns:adec="http://schemas.microsoft.com/office/drawing/2017/decorative" val="1"/>
+                <adec:decorative xmlns:adec="http://schemas.microsoft.com/office/drawing/2017/decorative" xmlns="" val="1"/>
               </a:ext>
             </a:extLst>
           </p:cNvPr>
@@ -9843,7 +9847,7 @@
           <p:nvPr>
             <p:extLst>
               <p:ext uri="{386F3935-93C4-4BCD-93E2-E3B085C9AB24}">
-                <p16:designElem xmlns:p16="http://schemas.microsoft.com/office/powerpoint/2015/main" val="1"/>
+                <p16:designElem xmlns:p16="http://schemas.microsoft.com/office/powerpoint/2015/main" xmlns="" val="1"/>
               </p:ext>
             </p:extLst>
           </p:nvPr>
@@ -9893,7 +9897,7 @@
           <p:cNvPr id="2" name="Title 1">
             <a:extLst>
               <a:ext uri="{FF2B5EF4-FFF2-40B4-BE49-F238E27FC236}">
-                <a16:creationId xmlns:a16="http://schemas.microsoft.com/office/drawing/2014/main" id="{0DC7077D-C216-4157-BB93-71E66D105B3F}"/>
+                <a16:creationId xmlns:a16="http://schemas.microsoft.com/office/drawing/2014/main" xmlns="" id="{0DC7077D-C216-4157-BB93-71E66D105B3F}"/>
               </a:ext>
             </a:extLst>
           </p:cNvPr>
@@ -9936,7 +9940,7 @@
           <p:cNvPr id="10" name="Footer Placeholder 3">
             <a:extLst>
               <a:ext uri="{FF2B5EF4-FFF2-40B4-BE49-F238E27FC236}">
-                <a16:creationId xmlns:a16="http://schemas.microsoft.com/office/drawing/2014/main" id="{D9DEFC8B-AC91-A640-9E26-B3F9FB38660C}"/>
+                <a16:creationId xmlns:a16="http://schemas.microsoft.com/office/drawing/2014/main" xmlns="" id="{D9DEFC8B-AC91-A640-9E26-B3F9FB38660C}"/>
               </a:ext>
             </a:extLst>
           </p:cNvPr>
@@ -10000,10 +10004,10 @@
       </p:sp>
       <p:pic>
         <p:nvPicPr>
-          <p:cNvPr id="12" name="Picture 11" descr="A picture containing text&#13;&#10;&#13;&#10;Description automatically generated">
-            <a:extLst>
-              <a:ext uri="{FF2B5EF4-FFF2-40B4-BE49-F238E27FC236}">
-                <a16:creationId xmlns:a16="http://schemas.microsoft.com/office/drawing/2014/main" id="{D947164F-B38B-024A-9971-2858B9F6B9DD}"/>
+          <p:cNvPr id="12" name="Picture 11" descr="A picture containing text&#10;&#10;Description automatically generated">
+            <a:extLst>
+              <a:ext uri="{FF2B5EF4-FFF2-40B4-BE49-F238E27FC236}">
+                <a16:creationId xmlns:a16="http://schemas.microsoft.com/office/drawing/2014/main" xmlns="" id="{D947164F-B38B-024A-9971-2858B9F6B9DD}"/>
               </a:ext>
             </a:extLst>
           </p:cNvPr>
@@ -10069,7 +10073,7 @@
           <p:cNvPr id="6" name="Content Placeholder 5">
             <a:extLst>
               <a:ext uri="{FF2B5EF4-FFF2-40B4-BE49-F238E27FC236}">
-                <a16:creationId xmlns:a16="http://schemas.microsoft.com/office/drawing/2014/main" id="{1266B0DE-F58E-4FCD-9163-069CF4C4BD23}"/>
+                <a16:creationId xmlns:a16="http://schemas.microsoft.com/office/drawing/2014/main" xmlns="" id="{1266B0DE-F58E-4FCD-9163-069CF4C4BD23}"/>
               </a:ext>
             </a:extLst>
           </p:cNvPr>
@@ -10104,7 +10108,7 @@
           <p:cNvPr id="15" name="Footer Placeholder 3">
             <a:extLst>
               <a:ext uri="{FF2B5EF4-FFF2-40B4-BE49-F238E27FC236}">
-                <a16:creationId xmlns:a16="http://schemas.microsoft.com/office/drawing/2014/main" id="{9DC36616-78F7-794F-BE6C-AE529367951A}"/>
+                <a16:creationId xmlns:a16="http://schemas.microsoft.com/office/drawing/2014/main" xmlns="" id="{9DC36616-78F7-794F-BE6C-AE529367951A}"/>
               </a:ext>
             </a:extLst>
           </p:cNvPr>
@@ -10168,10 +10172,10 @@
       </p:sp>
       <p:pic>
         <p:nvPicPr>
-          <p:cNvPr id="17" name="Picture 16" descr="A picture containing text&#13;&#10;&#13;&#10;Description automatically generated">
-            <a:extLst>
-              <a:ext uri="{FF2B5EF4-FFF2-40B4-BE49-F238E27FC236}">
-                <a16:creationId xmlns:a16="http://schemas.microsoft.com/office/drawing/2014/main" id="{2E4E5F20-2549-E74C-8A3A-6521658F7901}"/>
+          <p:cNvPr id="17" name="Picture 16" descr="A picture containing text&#10;&#10;Description automatically generated">
+            <a:extLst>
+              <a:ext uri="{FF2B5EF4-FFF2-40B4-BE49-F238E27FC236}">
+                <a16:creationId xmlns:a16="http://schemas.microsoft.com/office/drawing/2014/main" xmlns="" id="{2E4E5F20-2549-E74C-8A3A-6521658F7901}"/>
               </a:ext>
             </a:extLst>
           </p:cNvPr>
@@ -10248,10 +10252,10 @@
           <p:cNvPr id="12" name="Down Arrow 7">
             <a:extLst>
               <a:ext uri="{FF2B5EF4-FFF2-40B4-BE49-F238E27FC236}">
-                <a16:creationId xmlns:a16="http://schemas.microsoft.com/office/drawing/2014/main" id="{73DE2CFE-42F2-48F0-8706-5264E012B10C}"/>
+                <a16:creationId xmlns:a16="http://schemas.microsoft.com/office/drawing/2014/main" xmlns="" id="{73DE2CFE-42F2-48F0-8706-5264E012B10C}"/>
               </a:ext>
               <a:ext uri="{C183D7F6-B498-43B3-948B-1728B52AA6E4}">
-                <adec:decorative xmlns:adec="http://schemas.microsoft.com/office/drawing/2017/decorative" val="1"/>
+                <adec:decorative xmlns:adec="http://schemas.microsoft.com/office/drawing/2017/decorative" xmlns="" val="1"/>
               </a:ext>
             </a:extLst>
           </p:cNvPr>
@@ -10261,7 +10265,7 @@
           <p:nvPr>
             <p:extLst>
               <p:ext uri="{386F3935-93C4-4BCD-93E2-E3B085C9AB24}">
-                <p16:designElem xmlns:p16="http://schemas.microsoft.com/office/powerpoint/2015/main" val="1"/>
+                <p16:designElem xmlns:p16="http://schemas.microsoft.com/office/powerpoint/2015/main" xmlns="" val="1"/>
               </p:ext>
             </p:extLst>
           </p:nvPr>
@@ -10343,7 +10347,7 @@
           <p:cNvPr id="3" name="Content Placeholder 2">
             <a:extLst>
               <a:ext uri="{FF2B5EF4-FFF2-40B4-BE49-F238E27FC236}">
-                <a16:creationId xmlns:a16="http://schemas.microsoft.com/office/drawing/2014/main" id="{B23C0D60-0329-3243-8AD5-B3BAA3740CDE}"/>
+                <a16:creationId xmlns:a16="http://schemas.microsoft.com/office/drawing/2014/main" xmlns="" id="{B23C0D60-0329-3243-8AD5-B3BAA3740CDE}"/>
               </a:ext>
             </a:extLst>
           </p:cNvPr>
@@ -10387,7 +10391,7 @@
           <p:cNvPr id="6" name="Picture 5" descr="File:MVC Diagram (Model-View-Controller).svg - Wikimedia ...">
             <a:extLst>
               <a:ext uri="{FF2B5EF4-FFF2-40B4-BE49-F238E27FC236}">
-                <a16:creationId xmlns:a16="http://schemas.microsoft.com/office/drawing/2014/main" id="{48C6C23E-5A62-AD42-970B-94D2CCC208D6}"/>
+                <a16:creationId xmlns:a16="http://schemas.microsoft.com/office/drawing/2014/main" xmlns="" id="{48C6C23E-5A62-AD42-970B-94D2CCC208D6}"/>
               </a:ext>
             </a:extLst>
           </p:cNvPr>
@@ -10403,7 +10407,7 @@
                 <a14:useLocalDpi xmlns:a14="http://schemas.microsoft.com/office/drawing/2010/main" val="0"/>
               </a:ext>
               <a:ext uri="{837473B0-CC2E-450A-ABE3-18F120FF3D39}">
-                <a1611:picAttrSrcUrl xmlns:a1611="http://schemas.microsoft.com/office/drawing/2016/11/main" r:id="rId3"/>
+                <a1611:picAttrSrcUrl xmlns:a1611="http://schemas.microsoft.com/office/drawing/2016/11/main" xmlns="" r:id="rId3"/>
               </a:ext>
             </a:extLst>
           </a:blip>
@@ -10426,7 +10430,7 @@
           <p:cNvPr id="7" name="TextBox 6">
             <a:extLst>
               <a:ext uri="{FF2B5EF4-FFF2-40B4-BE49-F238E27FC236}">
-                <a16:creationId xmlns:a16="http://schemas.microsoft.com/office/drawing/2014/main" id="{61182DDC-6AF8-BC43-9F32-20176C5CD41B}"/>
+                <a16:creationId xmlns:a16="http://schemas.microsoft.com/office/drawing/2014/main" xmlns="" id="{61182DDC-6AF8-BC43-9F32-20176C5CD41B}"/>
               </a:ext>
             </a:extLst>
           </p:cNvPr>
@@ -10464,7 +10468,7 @@
                 <a:hlinkClick r:id="rId3" tooltip="https://commons.wikimedia.org/wiki/File:MVC_Diagram_(Model-View-Controller).svg">
                   <a:extLst>
                     <a:ext uri="{A12FA001-AC4F-418D-AE19-62706E023703}">
-                      <ahyp:hlinkClr xmlns:ahyp="http://schemas.microsoft.com/office/drawing/2018/hyperlinkcolor" val="tx"/>
+                      <ahyp:hlinkClr xmlns:ahyp="http://schemas.microsoft.com/office/drawing/2018/hyperlinkcolor" xmlns="" val="tx"/>
                     </a:ext>
                   </a:extLst>
                 </a:hlinkClick>
@@ -10487,7 +10491,7 @@
                 <a:hlinkClick r:id="rId4" tooltip="https://creativecommons.org/licenses/by-sa/3.0/">
                   <a:extLst>
                     <a:ext uri="{A12FA001-AC4F-418D-AE19-62706E023703}">
-                      <ahyp:hlinkClr xmlns:ahyp="http://schemas.microsoft.com/office/drawing/2018/hyperlinkcolor" val="tx"/>
+                      <ahyp:hlinkClr xmlns:ahyp="http://schemas.microsoft.com/office/drawing/2018/hyperlinkcolor" xmlns="" val="tx"/>
                     </a:ext>
                   </a:extLst>
                 </a:hlinkClick>
@@ -10507,7 +10511,7 @@
           <p:cNvPr id="24" name="Footer Placeholder 3">
             <a:extLst>
               <a:ext uri="{FF2B5EF4-FFF2-40B4-BE49-F238E27FC236}">
-                <a16:creationId xmlns:a16="http://schemas.microsoft.com/office/drawing/2014/main" id="{DB29538A-C20C-7248-9B45-5423E22BC1C0}"/>
+                <a16:creationId xmlns:a16="http://schemas.microsoft.com/office/drawing/2014/main" xmlns="" id="{DB29538A-C20C-7248-9B45-5423E22BC1C0}"/>
               </a:ext>
             </a:extLst>
           </p:cNvPr>
@@ -10655,10 +10659,10 @@
       </p:sp>
       <p:pic>
         <p:nvPicPr>
-          <p:cNvPr id="26" name="Picture 25" descr="A picture containing text&#13;&#10;&#13;&#10;Description automatically generated">
-            <a:extLst>
-              <a:ext uri="{FF2B5EF4-FFF2-40B4-BE49-F238E27FC236}">
-                <a16:creationId xmlns:a16="http://schemas.microsoft.com/office/drawing/2014/main" id="{6E592722-8696-2E40-8937-73430544D905}"/>
+          <p:cNvPr id="26" name="Picture 25" descr="A picture containing text&#10;&#10;Description automatically generated">
+            <a:extLst>
+              <a:ext uri="{FF2B5EF4-FFF2-40B4-BE49-F238E27FC236}">
+                <a16:creationId xmlns:a16="http://schemas.microsoft.com/office/drawing/2014/main" xmlns="" id="{6E592722-8696-2E40-8937-73430544D905}"/>
               </a:ext>
             </a:extLst>
           </p:cNvPr>
@@ -10735,10 +10739,10 @@
           <p:cNvPr id="10" name="Down Arrow 7">
             <a:extLst>
               <a:ext uri="{FF2B5EF4-FFF2-40B4-BE49-F238E27FC236}">
-                <a16:creationId xmlns:a16="http://schemas.microsoft.com/office/drawing/2014/main" id="{73DE2CFE-42F2-48F0-8706-5264E012B10C}"/>
+                <a16:creationId xmlns:a16="http://schemas.microsoft.com/office/drawing/2014/main" xmlns="" id="{73DE2CFE-42F2-48F0-8706-5264E012B10C}"/>
               </a:ext>
               <a:ext uri="{C183D7F6-B498-43B3-948B-1728B52AA6E4}">
-                <adec:decorative xmlns:adec="http://schemas.microsoft.com/office/drawing/2017/decorative" val="1"/>
+                <adec:decorative xmlns:adec="http://schemas.microsoft.com/office/drawing/2017/decorative" xmlns="" val="1"/>
               </a:ext>
             </a:extLst>
           </p:cNvPr>
@@ -10748,7 +10752,7 @@
           <p:nvPr>
             <p:extLst>
               <p:ext uri="{386F3935-93C4-4BCD-93E2-E3B085C9AB24}">
-                <p16:designElem xmlns:p16="http://schemas.microsoft.com/office/powerpoint/2015/main" val="1"/>
+                <p16:designElem xmlns:p16="http://schemas.microsoft.com/office/powerpoint/2015/main" xmlns="" val="1"/>
               </p:ext>
             </p:extLst>
           </p:nvPr>
@@ -10830,7 +10834,7 @@
           <p:cNvPr id="3" name="Content Placeholder 2">
             <a:extLst>
               <a:ext uri="{FF2B5EF4-FFF2-40B4-BE49-F238E27FC236}">
-                <a16:creationId xmlns:a16="http://schemas.microsoft.com/office/drawing/2014/main" id="{B23C0D60-0329-3243-8AD5-B3BAA3740CDE}"/>
+                <a16:creationId xmlns:a16="http://schemas.microsoft.com/office/drawing/2014/main" xmlns="" id="{B23C0D60-0329-3243-8AD5-B3BAA3740CDE}"/>
               </a:ext>
             </a:extLst>
           </p:cNvPr>
@@ -10869,7 +10873,7 @@
           <p:cNvPr id="5" name="Picture 4" descr="A screenshot of a social media post&#10;&#10;Description automatically generated">
             <a:extLst>
               <a:ext uri="{FF2B5EF4-FFF2-40B4-BE49-F238E27FC236}">
-                <a16:creationId xmlns:a16="http://schemas.microsoft.com/office/drawing/2014/main" id="{5DAD2AD8-D796-ED4E-9DCC-F4A3496C4C65}"/>
+                <a16:creationId xmlns:a16="http://schemas.microsoft.com/office/drawing/2014/main" xmlns="" id="{5DAD2AD8-D796-ED4E-9DCC-F4A3496C4C65}"/>
               </a:ext>
             </a:extLst>
           </p:cNvPr>
@@ -10905,7 +10909,7 @@
           <p:cNvPr id="4" name="Footer Placeholder 3">
             <a:extLst>
               <a:ext uri="{FF2B5EF4-FFF2-40B4-BE49-F238E27FC236}">
-                <a16:creationId xmlns:a16="http://schemas.microsoft.com/office/drawing/2014/main" id="{B60BE99C-1942-1240-AFA9-4F0B6CDCB62F}"/>
+                <a16:creationId xmlns:a16="http://schemas.microsoft.com/office/drawing/2014/main" xmlns="" id="{B60BE99C-1942-1240-AFA9-4F0B6CDCB62F}"/>
               </a:ext>
             </a:extLst>
           </p:cNvPr>
@@ -10969,10 +10973,10 @@
       </p:sp>
       <p:pic>
         <p:nvPicPr>
-          <p:cNvPr id="9" name="Picture 8" descr="A picture containing text&#13;&#10;&#13;&#10;Description automatically generated">
-            <a:extLst>
-              <a:ext uri="{FF2B5EF4-FFF2-40B4-BE49-F238E27FC236}">
-                <a16:creationId xmlns:a16="http://schemas.microsoft.com/office/drawing/2014/main" id="{393876D4-08E4-EC43-A2C9-9A026DE70113}"/>
+          <p:cNvPr id="9" name="Picture 8" descr="A picture containing text&#10;&#10;Description automatically generated">
+            <a:extLst>
+              <a:ext uri="{FF2B5EF4-FFF2-40B4-BE49-F238E27FC236}">
+                <a16:creationId xmlns:a16="http://schemas.microsoft.com/office/drawing/2014/main" xmlns="" id="{393876D4-08E4-EC43-A2C9-9A026DE70113}"/>
               </a:ext>
             </a:extLst>
           </p:cNvPr>
@@ -11049,10 +11053,10 @@
           <p:cNvPr id="10" name="Down Arrow 7">
             <a:extLst>
               <a:ext uri="{FF2B5EF4-FFF2-40B4-BE49-F238E27FC236}">
-                <a16:creationId xmlns:a16="http://schemas.microsoft.com/office/drawing/2014/main" id="{73DE2CFE-42F2-48F0-8706-5264E012B10C}"/>
+                <a16:creationId xmlns:a16="http://schemas.microsoft.com/office/drawing/2014/main" xmlns="" id="{73DE2CFE-42F2-48F0-8706-5264E012B10C}"/>
               </a:ext>
               <a:ext uri="{C183D7F6-B498-43B3-948B-1728B52AA6E4}">
-                <adec:decorative xmlns:adec="http://schemas.microsoft.com/office/drawing/2017/decorative" val="1"/>
+                <adec:decorative xmlns:adec="http://schemas.microsoft.com/office/drawing/2017/decorative" xmlns="" val="1"/>
               </a:ext>
             </a:extLst>
           </p:cNvPr>
@@ -11062,7 +11066,7 @@
           <p:nvPr>
             <p:extLst>
               <p:ext uri="{386F3935-93C4-4BCD-93E2-E3B085C9AB24}">
-                <p16:designElem xmlns:p16="http://schemas.microsoft.com/office/powerpoint/2015/main" val="1"/>
+                <p16:designElem xmlns:p16="http://schemas.microsoft.com/office/powerpoint/2015/main" xmlns="" val="1"/>
               </p:ext>
             </p:extLst>
           </p:nvPr>
@@ -11144,7 +11148,7 @@
           <p:cNvPr id="3" name="Content Placeholder 2">
             <a:extLst>
               <a:ext uri="{FF2B5EF4-FFF2-40B4-BE49-F238E27FC236}">
-                <a16:creationId xmlns:a16="http://schemas.microsoft.com/office/drawing/2014/main" id="{B23C0D60-0329-3243-8AD5-B3BAA3740CDE}"/>
+                <a16:creationId xmlns:a16="http://schemas.microsoft.com/office/drawing/2014/main" xmlns="" id="{B23C0D60-0329-3243-8AD5-B3BAA3740CDE}"/>
               </a:ext>
             </a:extLst>
           </p:cNvPr>
@@ -11183,7 +11187,7 @@
           <p:cNvPr id="5" name="Picture 4" descr="A screenshot of a social media post&#10;&#10;Description automatically generated">
             <a:extLst>
               <a:ext uri="{FF2B5EF4-FFF2-40B4-BE49-F238E27FC236}">
-                <a16:creationId xmlns:a16="http://schemas.microsoft.com/office/drawing/2014/main" id="{B6F957AD-5C38-B744-9794-8BAC30349CD0}"/>
+                <a16:creationId xmlns:a16="http://schemas.microsoft.com/office/drawing/2014/main" xmlns="" id="{B6F957AD-5C38-B744-9794-8BAC30349CD0}"/>
               </a:ext>
             </a:extLst>
           </p:cNvPr>
@@ -11219,7 +11223,7 @@
           <p:cNvPr id="4" name="Footer Placeholder 3">
             <a:extLst>
               <a:ext uri="{FF2B5EF4-FFF2-40B4-BE49-F238E27FC236}">
-                <a16:creationId xmlns:a16="http://schemas.microsoft.com/office/drawing/2014/main" id="{B60BE99C-1942-1240-AFA9-4F0B6CDCB62F}"/>
+                <a16:creationId xmlns:a16="http://schemas.microsoft.com/office/drawing/2014/main" xmlns="" id="{B60BE99C-1942-1240-AFA9-4F0B6CDCB62F}"/>
               </a:ext>
             </a:extLst>
           </p:cNvPr>
@@ -11263,10 +11267,10 @@
       </p:sp>
       <p:pic>
         <p:nvPicPr>
-          <p:cNvPr id="9" name="Picture 8" descr="A picture containing text&#13;&#10;&#13;&#10;Description automatically generated">
-            <a:extLst>
-              <a:ext uri="{FF2B5EF4-FFF2-40B4-BE49-F238E27FC236}">
-                <a16:creationId xmlns:a16="http://schemas.microsoft.com/office/drawing/2014/main" id="{7C3585D6-73F4-FE40-A36F-39AC998466AE}"/>
+          <p:cNvPr id="9" name="Picture 8" descr="A picture containing text&#10;&#10;Description automatically generated">
+            <a:extLst>
+              <a:ext uri="{FF2B5EF4-FFF2-40B4-BE49-F238E27FC236}">
+                <a16:creationId xmlns:a16="http://schemas.microsoft.com/office/drawing/2014/main" xmlns="" id="{7C3585D6-73F4-FE40-A36F-39AC998466AE}"/>
               </a:ext>
             </a:extLst>
           </p:cNvPr>
@@ -11343,7 +11347,7 @@
           <p:cNvPr id="3" name="Content Placeholder 2">
             <a:extLst>
               <a:ext uri="{FF2B5EF4-FFF2-40B4-BE49-F238E27FC236}">
-                <a16:creationId xmlns:a16="http://schemas.microsoft.com/office/drawing/2014/main" id="{B23C0D60-0329-3243-8AD5-B3BAA3740CDE}"/>
+                <a16:creationId xmlns:a16="http://schemas.microsoft.com/office/drawing/2014/main" xmlns="" id="{B23C0D60-0329-3243-8AD5-B3BAA3740CDE}"/>
               </a:ext>
             </a:extLst>
           </p:cNvPr>
@@ -11382,7 +11386,7 @@
           <p:cNvPr id="4" name="Footer Placeholder 3">
             <a:extLst>
               <a:ext uri="{FF2B5EF4-FFF2-40B4-BE49-F238E27FC236}">
-                <a16:creationId xmlns:a16="http://schemas.microsoft.com/office/drawing/2014/main" id="{B60BE99C-1942-1240-AFA9-4F0B6CDCB62F}"/>
+                <a16:creationId xmlns:a16="http://schemas.microsoft.com/office/drawing/2014/main" xmlns="" id="{B60BE99C-1942-1240-AFA9-4F0B6CDCB62F}"/>
               </a:ext>
             </a:extLst>
           </p:cNvPr>
@@ -11429,7 +11433,7 @@
           <p:cNvPr id="5" name="Picture 4" descr="A screenshot of a cell phone&#10;&#10;Description automatically generated">
             <a:extLst>
               <a:ext uri="{FF2B5EF4-FFF2-40B4-BE49-F238E27FC236}">
-                <a16:creationId xmlns:a16="http://schemas.microsoft.com/office/drawing/2014/main" id="{FEF79782-D416-E84B-9E17-381E920EF338}"/>
+                <a16:creationId xmlns:a16="http://schemas.microsoft.com/office/drawing/2014/main" xmlns="" id="{FEF79782-D416-E84B-9E17-381E920EF338}"/>
               </a:ext>
             </a:extLst>
           </p:cNvPr>
@@ -11462,10 +11466,10 @@
       </p:pic>
       <p:pic>
         <p:nvPicPr>
-          <p:cNvPr id="9" name="Picture 8" descr="A display in a room&#13;&#10;&#13;&#10;Description automatically generated">
-            <a:extLst>
-              <a:ext uri="{FF2B5EF4-FFF2-40B4-BE49-F238E27FC236}">
-                <a16:creationId xmlns:a16="http://schemas.microsoft.com/office/drawing/2014/main" id="{7FCB8698-A7FC-0B40-910C-26C36F93CBB2}"/>
+          <p:cNvPr id="9" name="Picture 8" descr="A display in a room&#10;&#10;Description automatically generated">
+            <a:extLst>
+              <a:ext uri="{FF2B5EF4-FFF2-40B4-BE49-F238E27FC236}">
+                <a16:creationId xmlns:a16="http://schemas.microsoft.com/office/drawing/2014/main" xmlns="" id="{7FCB8698-A7FC-0B40-910C-26C36F93CBB2}"/>
               </a:ext>
             </a:extLst>
           </p:cNvPr>
@@ -11501,7 +11505,7 @@
           <p:cNvPr id="11" name="Straight Connector 10">
             <a:extLst>
               <a:ext uri="{FF2B5EF4-FFF2-40B4-BE49-F238E27FC236}">
-                <a16:creationId xmlns:a16="http://schemas.microsoft.com/office/drawing/2014/main" id="{E1FC7945-B3FA-D243-B547-4FFBD12FF712}"/>
+                <a16:creationId xmlns:a16="http://schemas.microsoft.com/office/drawing/2014/main" xmlns="" id="{E1FC7945-B3FA-D243-B547-4FFBD12FF712}"/>
               </a:ext>
             </a:extLst>
           </p:cNvPr>
@@ -11539,7 +11543,7 @@
           <p:cNvPr id="13" name="Straight Connector 12">
             <a:extLst>
               <a:ext uri="{FF2B5EF4-FFF2-40B4-BE49-F238E27FC236}">
-                <a16:creationId xmlns:a16="http://schemas.microsoft.com/office/drawing/2014/main" id="{50913FED-340E-7F4C-972A-6225A1F0D16A}"/>
+                <a16:creationId xmlns:a16="http://schemas.microsoft.com/office/drawing/2014/main" xmlns="" id="{50913FED-340E-7F4C-972A-6225A1F0D16A}"/>
               </a:ext>
             </a:extLst>
           </p:cNvPr>
@@ -11577,7 +11581,7 @@
           <p:cNvPr id="14" name="Straight Connector 13">
             <a:extLst>
               <a:ext uri="{FF2B5EF4-FFF2-40B4-BE49-F238E27FC236}">
-                <a16:creationId xmlns:a16="http://schemas.microsoft.com/office/drawing/2014/main" id="{DB887867-7409-7043-9991-5D7595F1B316}"/>
+                <a16:creationId xmlns:a16="http://schemas.microsoft.com/office/drawing/2014/main" xmlns="" id="{DB887867-7409-7043-9991-5D7595F1B316}"/>
               </a:ext>
             </a:extLst>
           </p:cNvPr>
@@ -11612,10 +11616,10 @@
       </p:cxnSp>
       <p:pic>
         <p:nvPicPr>
-          <p:cNvPr id="15" name="Picture 14" descr="A picture containing text&#13;&#10;&#13;&#10;Description automatically generated">
-            <a:extLst>
-              <a:ext uri="{FF2B5EF4-FFF2-40B4-BE49-F238E27FC236}">
-                <a16:creationId xmlns:a16="http://schemas.microsoft.com/office/drawing/2014/main" id="{DE82E8F8-27C9-F340-B9C4-9D78F90863DC}"/>
+          <p:cNvPr id="15" name="Picture 14" descr="A picture containing text&#10;&#10;Description automatically generated">
+            <a:extLst>
+              <a:ext uri="{FF2B5EF4-FFF2-40B4-BE49-F238E27FC236}">
+                <a16:creationId xmlns:a16="http://schemas.microsoft.com/office/drawing/2014/main" xmlns="" id="{DE82E8F8-27C9-F340-B9C4-9D78F90863DC}"/>
               </a:ext>
             </a:extLst>
           </p:cNvPr>
@@ -11648,10 +11652,10 @@
       </p:pic>
       <p:pic>
         <p:nvPicPr>
-          <p:cNvPr id="17" name="Picture 16" descr="A close up of a logo&#13;&#10;&#13;&#10;Description automatically generated">
-            <a:extLst>
-              <a:ext uri="{FF2B5EF4-FFF2-40B4-BE49-F238E27FC236}">
-                <a16:creationId xmlns:a16="http://schemas.microsoft.com/office/drawing/2014/main" id="{74D4AC4F-6505-9A4A-8822-8BF172A13B22}"/>
+          <p:cNvPr id="17" name="Picture 16" descr="A close up of a logo&#10;&#10;Description automatically generated">
+            <a:extLst>
+              <a:ext uri="{FF2B5EF4-FFF2-40B4-BE49-F238E27FC236}">
+                <a16:creationId xmlns:a16="http://schemas.microsoft.com/office/drawing/2014/main" xmlns="" id="{74D4AC4F-6505-9A4A-8822-8BF172A13B22}"/>
               </a:ext>
             </a:extLst>
           </p:cNvPr>
@@ -11728,10 +11732,10 @@
           <p:cNvPr id="11" name="Down Arrow 7">
             <a:extLst>
               <a:ext uri="{FF2B5EF4-FFF2-40B4-BE49-F238E27FC236}">
-                <a16:creationId xmlns:a16="http://schemas.microsoft.com/office/drawing/2014/main" id="{73DE2CFE-42F2-48F0-8706-5264E012B10C}"/>
+                <a16:creationId xmlns:a16="http://schemas.microsoft.com/office/drawing/2014/main" xmlns="" id="{73DE2CFE-42F2-48F0-8706-5264E012B10C}"/>
               </a:ext>
               <a:ext uri="{C183D7F6-B498-43B3-948B-1728B52AA6E4}">
-                <adec:decorative xmlns:adec="http://schemas.microsoft.com/office/drawing/2017/decorative" val="1"/>
+                <adec:decorative xmlns:adec="http://schemas.microsoft.com/office/drawing/2017/decorative" xmlns="" val="1"/>
               </a:ext>
             </a:extLst>
           </p:cNvPr>
@@ -11741,7 +11745,7 @@
           <p:nvPr>
             <p:extLst>
               <p:ext uri="{386F3935-93C4-4BCD-93E2-E3B085C9AB24}">
-                <p16:designElem xmlns:p16="http://schemas.microsoft.com/office/powerpoint/2015/main" val="1"/>
+                <p16:designElem xmlns:p16="http://schemas.microsoft.com/office/powerpoint/2015/main" xmlns="" val="1"/>
               </p:ext>
             </p:extLst>
           </p:nvPr>
@@ -11823,7 +11827,7 @@
           <p:cNvPr id="3" name="Content Placeholder 2">
             <a:extLst>
               <a:ext uri="{FF2B5EF4-FFF2-40B4-BE49-F238E27FC236}">
-                <a16:creationId xmlns:a16="http://schemas.microsoft.com/office/drawing/2014/main" id="{B23C0D60-0329-3243-8AD5-B3BAA3740CDE}"/>
+                <a16:creationId xmlns:a16="http://schemas.microsoft.com/office/drawing/2014/main" xmlns="" id="{B23C0D60-0329-3243-8AD5-B3BAA3740CDE}"/>
               </a:ext>
             </a:extLst>
           </p:cNvPr>
@@ -11862,7 +11866,7 @@
           <p:cNvPr id="6" name="Picture 5">
             <a:extLst>
               <a:ext uri="{FF2B5EF4-FFF2-40B4-BE49-F238E27FC236}">
-                <a16:creationId xmlns:a16="http://schemas.microsoft.com/office/drawing/2014/main" id="{691ADE22-F657-674B-A7F3-98B92E936A13}"/>
+                <a16:creationId xmlns:a16="http://schemas.microsoft.com/office/drawing/2014/main" xmlns="" id="{691ADE22-F657-674B-A7F3-98B92E936A13}"/>
               </a:ext>
             </a:extLst>
           </p:cNvPr>
@@ -11898,7 +11902,7 @@
           <p:cNvPr id="4" name="Footer Placeholder 3">
             <a:extLst>
               <a:ext uri="{FF2B5EF4-FFF2-40B4-BE49-F238E27FC236}">
-                <a16:creationId xmlns:a16="http://schemas.microsoft.com/office/drawing/2014/main" id="{B60BE99C-1942-1240-AFA9-4F0B6CDCB62F}"/>
+                <a16:creationId xmlns:a16="http://schemas.microsoft.com/office/drawing/2014/main" xmlns="" id="{B60BE99C-1942-1240-AFA9-4F0B6CDCB62F}"/>
               </a:ext>
             </a:extLst>
           </p:cNvPr>
@@ -11942,10 +11946,10 @@
       </p:sp>
       <p:pic>
         <p:nvPicPr>
-          <p:cNvPr id="9" name="Picture 8" descr="A picture containing text&#13;&#10;&#13;&#10;Description automatically generated">
-            <a:extLst>
-              <a:ext uri="{FF2B5EF4-FFF2-40B4-BE49-F238E27FC236}">
-                <a16:creationId xmlns:a16="http://schemas.microsoft.com/office/drawing/2014/main" id="{0FE1579A-EB31-7245-8662-6F82EAEE6C05}"/>
+          <p:cNvPr id="9" name="Picture 8" descr="A picture containing text&#10;&#10;Description automatically generated">
+            <a:extLst>
+              <a:ext uri="{FF2B5EF4-FFF2-40B4-BE49-F238E27FC236}">
+                <a16:creationId xmlns:a16="http://schemas.microsoft.com/office/drawing/2014/main" xmlns="" id="{0FE1579A-EB31-7245-8662-6F82EAEE6C05}"/>
               </a:ext>
             </a:extLst>
           </p:cNvPr>
@@ -12022,10 +12026,10 @@
           <p:cNvPr id="11" name="Down Arrow 7">
             <a:extLst>
               <a:ext uri="{FF2B5EF4-FFF2-40B4-BE49-F238E27FC236}">
-                <a16:creationId xmlns:a16="http://schemas.microsoft.com/office/drawing/2014/main" id="{73DE2CFE-42F2-48F0-8706-5264E012B10C}"/>
+                <a16:creationId xmlns:a16="http://schemas.microsoft.com/office/drawing/2014/main" xmlns="" id="{73DE2CFE-42F2-48F0-8706-5264E012B10C}"/>
               </a:ext>
               <a:ext uri="{C183D7F6-B498-43B3-948B-1728B52AA6E4}">
-                <adec:decorative xmlns:adec="http://schemas.microsoft.com/office/drawing/2017/decorative" val="1"/>
+                <adec:decorative xmlns:adec="http://schemas.microsoft.com/office/drawing/2017/decorative" xmlns="" val="1"/>
               </a:ext>
             </a:extLst>
           </p:cNvPr>
@@ -12035,7 +12039,7 @@
           <p:nvPr>
             <p:extLst>
               <p:ext uri="{386F3935-93C4-4BCD-93E2-E3B085C9AB24}">
-                <p16:designElem xmlns:p16="http://schemas.microsoft.com/office/powerpoint/2015/main" val="1"/>
+                <p16:designElem xmlns:p16="http://schemas.microsoft.com/office/powerpoint/2015/main" xmlns="" val="1"/>
               </p:ext>
             </p:extLst>
           </p:nvPr>
@@ -12117,7 +12121,7 @@
           <p:cNvPr id="3" name="Content Placeholder 2">
             <a:extLst>
               <a:ext uri="{FF2B5EF4-FFF2-40B4-BE49-F238E27FC236}">
-                <a16:creationId xmlns:a16="http://schemas.microsoft.com/office/drawing/2014/main" id="{B23C0D60-0329-3243-8AD5-B3BAA3740CDE}"/>
+                <a16:creationId xmlns:a16="http://schemas.microsoft.com/office/drawing/2014/main" xmlns="" id="{B23C0D60-0329-3243-8AD5-B3BAA3740CDE}"/>
               </a:ext>
             </a:extLst>
           </p:cNvPr>
@@ -12161,7 +12165,7 @@
           <p:cNvPr id="5" name="Picture 4" descr="Ahmed BESBES - Data Science Portfolio – Understanding deep ...">
             <a:extLst>
               <a:ext uri="{FF2B5EF4-FFF2-40B4-BE49-F238E27FC236}">
-                <a16:creationId xmlns:a16="http://schemas.microsoft.com/office/drawing/2014/main" id="{6DAAEA68-12DF-1C49-83B3-234AD5F969BE}"/>
+                <a16:creationId xmlns:a16="http://schemas.microsoft.com/office/drawing/2014/main" xmlns="" id="{6DAAEA68-12DF-1C49-83B3-234AD5F969BE}"/>
               </a:ext>
             </a:extLst>
           </p:cNvPr>
@@ -12177,7 +12181,7 @@
                 <a14:useLocalDpi xmlns:a14="http://schemas.microsoft.com/office/drawing/2010/main" val="0"/>
               </a:ext>
               <a:ext uri="{837473B0-CC2E-450A-ABE3-18F120FF3D39}">
-                <a1611:picAttrSrcUrl xmlns:a1611="http://schemas.microsoft.com/office/drawing/2016/11/main" r:id="rId3"/>
+                <a1611:picAttrSrcUrl xmlns:a1611="http://schemas.microsoft.com/office/drawing/2016/11/main" xmlns="" r:id="rId3"/>
               </a:ext>
             </a:extLst>
           </a:blip>
@@ -12200,7 +12204,7 @@
           <p:cNvPr id="4" name="Footer Placeholder 3">
             <a:extLst>
               <a:ext uri="{FF2B5EF4-FFF2-40B4-BE49-F238E27FC236}">
-                <a16:creationId xmlns:a16="http://schemas.microsoft.com/office/drawing/2014/main" id="{B60BE99C-1942-1240-AFA9-4F0B6CDCB62F}"/>
+                <a16:creationId xmlns:a16="http://schemas.microsoft.com/office/drawing/2014/main" xmlns="" id="{B60BE99C-1942-1240-AFA9-4F0B6CDCB62F}"/>
               </a:ext>
             </a:extLst>
           </p:cNvPr>
@@ -12267,7 +12271,7 @@
           <p:cNvPr id="6" name="TextBox 5">
             <a:extLst>
               <a:ext uri="{FF2B5EF4-FFF2-40B4-BE49-F238E27FC236}">
-                <a16:creationId xmlns:a16="http://schemas.microsoft.com/office/drawing/2014/main" id="{D032F5AE-1465-C24D-932A-73331915A0F7}"/>
+                <a16:creationId xmlns:a16="http://schemas.microsoft.com/office/drawing/2014/main" xmlns="" id="{D032F5AE-1465-C24D-932A-73331915A0F7}"/>
               </a:ext>
             </a:extLst>
           </p:cNvPr>
@@ -12305,7 +12309,7 @@
                 <a:hlinkClick r:id="rId3" tooltip="https://ahmedbesbes.com/understanding-deep-convolutional-neural-networks-with-a-practical-use-case-in-tensorflow-and-keras.html">
                   <a:extLst>
                     <a:ext uri="{A12FA001-AC4F-418D-AE19-62706E023703}">
-                      <ahyp:hlinkClr xmlns:ahyp="http://schemas.microsoft.com/office/drawing/2018/hyperlinkcolor" val="tx"/>
+                      <ahyp:hlinkClr xmlns:ahyp="http://schemas.microsoft.com/office/drawing/2018/hyperlinkcolor" xmlns="" val="tx"/>
                     </a:ext>
                   </a:extLst>
                 </a:hlinkClick>
@@ -12328,7 +12332,7 @@
                 <a:hlinkClick r:id="rId4" tooltip="https://creativecommons.org/licenses/by-sa/3.0/">
                   <a:extLst>
                     <a:ext uri="{A12FA001-AC4F-418D-AE19-62706E023703}">
-                      <ahyp:hlinkClr xmlns:ahyp="http://schemas.microsoft.com/office/drawing/2018/hyperlinkcolor" val="tx"/>
+                      <ahyp:hlinkClr xmlns:ahyp="http://schemas.microsoft.com/office/drawing/2018/hyperlinkcolor" xmlns="" val="tx"/>
                     </a:ext>
                   </a:extLst>
                 </a:hlinkClick>
@@ -12345,10 +12349,10 @@
       </p:sp>
       <p:pic>
         <p:nvPicPr>
-          <p:cNvPr id="8" name="Picture 7" descr="A picture containing text&#13;&#10;&#13;&#10;Description automatically generated">
-            <a:extLst>
-              <a:ext uri="{FF2B5EF4-FFF2-40B4-BE49-F238E27FC236}">
-                <a16:creationId xmlns:a16="http://schemas.microsoft.com/office/drawing/2014/main" id="{1DAB7B48-8F49-7E4E-82A2-C140A4D34B38}"/>
+          <p:cNvPr id="8" name="Picture 7" descr="A picture containing text&#10;&#10;Description automatically generated">
+            <a:extLst>
+              <a:ext uri="{FF2B5EF4-FFF2-40B4-BE49-F238E27FC236}">
+                <a16:creationId xmlns:a16="http://schemas.microsoft.com/office/drawing/2014/main" xmlns="" id="{1DAB7B48-8F49-7E4E-82A2-C140A4D34B38}"/>
               </a:ext>
             </a:extLst>
           </p:cNvPr>
@@ -12425,10 +12429,10 @@
           <p:cNvPr id="6" name="Rectangle 8">
             <a:extLst>
               <a:ext uri="{FF2B5EF4-FFF2-40B4-BE49-F238E27FC236}">
-                <a16:creationId xmlns:a16="http://schemas.microsoft.com/office/drawing/2014/main" id="{D8386171-E87D-46AB-8718-4CE2A88748BD}"/>
+                <a16:creationId xmlns:a16="http://schemas.microsoft.com/office/drawing/2014/main" xmlns="" id="{D8386171-E87D-46AB-8718-4CE2A88748BD}"/>
               </a:ext>
               <a:ext uri="{C183D7F6-B498-43B3-948B-1728B52AA6E4}">
-                <adec:decorative xmlns:adec="http://schemas.microsoft.com/office/drawing/2017/decorative" val="1"/>
+                <adec:decorative xmlns:adec="http://schemas.microsoft.com/office/drawing/2017/decorative" xmlns="" val="1"/>
               </a:ext>
             </a:extLst>
           </p:cNvPr>
@@ -12438,7 +12442,7 @@
           <p:nvPr>
             <p:extLst>
               <p:ext uri="{386F3935-93C4-4BCD-93E2-E3B085C9AB24}">
-                <p16:designElem xmlns:p16="http://schemas.microsoft.com/office/powerpoint/2015/main" val="1"/>
+                <p16:designElem xmlns:p16="http://schemas.microsoft.com/office/powerpoint/2015/main" xmlns="" val="1"/>
               </p:ext>
             </p:extLst>
           </p:nvPr>
@@ -12488,10 +12492,10 @@
           <p:cNvPr id="7" name="Rounded Rectangle 26">
             <a:extLst>
               <a:ext uri="{FF2B5EF4-FFF2-40B4-BE49-F238E27FC236}">
-                <a16:creationId xmlns:a16="http://schemas.microsoft.com/office/drawing/2014/main" id="{207CB456-8849-413C-8210-B663779A32E0}"/>
+                <a16:creationId xmlns:a16="http://schemas.microsoft.com/office/drawing/2014/main" xmlns="" id="{207CB456-8849-413C-8210-B663779A32E0}"/>
               </a:ext>
               <a:ext uri="{C183D7F6-B498-43B3-948B-1728B52AA6E4}">
-                <adec:decorative xmlns:adec="http://schemas.microsoft.com/office/drawing/2017/decorative" val="1"/>
+                <adec:decorative xmlns:adec="http://schemas.microsoft.com/office/drawing/2017/decorative" xmlns="" val="1"/>
               </a:ext>
             </a:extLst>
           </p:cNvPr>
@@ -12501,7 +12505,7 @@
           <p:nvPr>
             <p:extLst>
               <p:ext uri="{386F3935-93C4-4BCD-93E2-E3B085C9AB24}">
-                <p16:designElem xmlns:p16="http://schemas.microsoft.com/office/powerpoint/2015/main" val="1"/>
+                <p16:designElem xmlns:p16="http://schemas.microsoft.com/office/powerpoint/2015/main" xmlns="" val="1"/>
               </p:ext>
             </p:extLst>
           </p:nvPr>
@@ -12562,10 +12566,10 @@
           <p:cNvPr id="8" name="Rectangle 12">
             <a:extLst>
               <a:ext uri="{FF2B5EF4-FFF2-40B4-BE49-F238E27FC236}">
-                <a16:creationId xmlns:a16="http://schemas.microsoft.com/office/drawing/2014/main" id="{E513936D-D1EB-4E42-A97F-942BA1F3DFA7}"/>
+                <a16:creationId xmlns:a16="http://schemas.microsoft.com/office/drawing/2014/main" xmlns="" id="{E513936D-D1EB-4E42-A97F-942BA1F3DFA7}"/>
               </a:ext>
               <a:ext uri="{C183D7F6-B498-43B3-948B-1728B52AA6E4}">
-                <adec:decorative xmlns:adec="http://schemas.microsoft.com/office/drawing/2017/decorative" val="1"/>
+                <adec:decorative xmlns:adec="http://schemas.microsoft.com/office/drawing/2017/decorative" xmlns="" val="1"/>
               </a:ext>
             </a:extLst>
           </p:cNvPr>
@@ -12575,7 +12579,7 @@
           <p:nvPr>
             <p:extLst>
               <p:ext uri="{386F3935-93C4-4BCD-93E2-E3B085C9AB24}">
-                <p16:designElem xmlns:p16="http://schemas.microsoft.com/office/powerpoint/2015/main" val="1"/>
+                <p16:designElem xmlns:p16="http://schemas.microsoft.com/office/powerpoint/2015/main" xmlns="" val="1"/>
               </p:ext>
             </p:extLst>
           </p:nvPr>
@@ -12625,7 +12629,7 @@
           <p:cNvPr id="2" name="Title 1">
             <a:extLst>
               <a:ext uri="{FF2B5EF4-FFF2-40B4-BE49-F238E27FC236}">
-                <a16:creationId xmlns:a16="http://schemas.microsoft.com/office/drawing/2014/main" id="{9E9E9FB3-DD87-EF4F-BB3E-C956F5312981}"/>
+                <a16:creationId xmlns:a16="http://schemas.microsoft.com/office/drawing/2014/main" xmlns="" id="{9E9E9FB3-DD87-EF4F-BB3E-C956F5312981}"/>
               </a:ext>
             </a:extLst>
           </p:cNvPr>
@@ -12668,7 +12672,7 @@
           <p:cNvPr id="12" name="Footer Placeholder 3">
             <a:extLst>
               <a:ext uri="{FF2B5EF4-FFF2-40B4-BE49-F238E27FC236}">
-                <a16:creationId xmlns:a16="http://schemas.microsoft.com/office/drawing/2014/main" id="{2AF81190-92FB-4748-A84B-ABB011BBB90A}"/>
+                <a16:creationId xmlns:a16="http://schemas.microsoft.com/office/drawing/2014/main" xmlns="" id="{2AF81190-92FB-4748-A84B-ABB011BBB90A}"/>
               </a:ext>
             </a:extLst>
           </p:cNvPr>
@@ -12816,10 +12820,10 @@
       </p:sp>
       <p:pic>
         <p:nvPicPr>
-          <p:cNvPr id="14" name="Picture 13" descr="A picture containing text&#13;&#10;&#13;&#10;Description automatically generated">
-            <a:extLst>
-              <a:ext uri="{FF2B5EF4-FFF2-40B4-BE49-F238E27FC236}">
-                <a16:creationId xmlns:a16="http://schemas.microsoft.com/office/drawing/2014/main" id="{8E98B0E5-53F4-2743-822E-880B2CC173BF}"/>
+          <p:cNvPr id="14" name="Picture 13" descr="A picture containing text&#10;&#10;Description automatically generated">
+            <a:extLst>
+              <a:ext uri="{FF2B5EF4-FFF2-40B4-BE49-F238E27FC236}">
+                <a16:creationId xmlns:a16="http://schemas.microsoft.com/office/drawing/2014/main" xmlns="" id="{8E98B0E5-53F4-2743-822E-880B2CC173BF}"/>
               </a:ext>
             </a:extLst>
           </p:cNvPr>

</xml_diff>